<commit_message>
Last update for ppt
</commit_message>
<xml_diff>
--- a/ReviewFactsBest.pptx
+++ b/ReviewFactsBest.pptx
@@ -5,21 +5,22 @@
     <p:sldMasterId id="2147483648" r:id="rId1"/>
   </p:sldMasterIdLst>
   <p:notesMasterIdLst>
-    <p:notesMasterId r:id="rId14"/>
+    <p:notesMasterId r:id="rId15"/>
   </p:notesMasterIdLst>
   <p:sldIdLst>
     <p:sldId id="256" r:id="rId2"/>
     <p:sldId id="257" r:id="rId3"/>
-    <p:sldId id="258" r:id="rId4"/>
-    <p:sldId id="259" r:id="rId5"/>
-    <p:sldId id="260" r:id="rId6"/>
-    <p:sldId id="265" r:id="rId7"/>
-    <p:sldId id="261" r:id="rId8"/>
-    <p:sldId id="266" r:id="rId9"/>
-    <p:sldId id="262" r:id="rId10"/>
-    <p:sldId id="263" r:id="rId11"/>
-    <p:sldId id="267" r:id="rId12"/>
-    <p:sldId id="264" r:id="rId13"/>
+    <p:sldId id="268" r:id="rId4"/>
+    <p:sldId id="258" r:id="rId5"/>
+    <p:sldId id="259" r:id="rId6"/>
+    <p:sldId id="260" r:id="rId7"/>
+    <p:sldId id="265" r:id="rId8"/>
+    <p:sldId id="261" r:id="rId9"/>
+    <p:sldId id="266" r:id="rId10"/>
+    <p:sldId id="262" r:id="rId11"/>
+    <p:sldId id="263" r:id="rId12"/>
+    <p:sldId id="267" r:id="rId13"/>
+    <p:sldId id="264" r:id="rId14"/>
   </p:sldIdLst>
   <p:sldSz cx="12192000" cy="6858000"/>
   <p:notesSz cx="6858000" cy="9144000"/>
@@ -208,7 +209,7 @@
           <a:p>
             <a:fld id="{5FD1A120-0D20-475B-81E2-6442C3B617AA}" type="datetimeFigureOut">
               <a:rPr lang="en-US" smtClean="0"/>
-              <a:t>6/28/2018</a:t>
+              <a:t>6/29/2018</a:t>
             </a:fld>
             <a:endParaRPr lang="en-US"/>
           </a:p>
@@ -4751,7 +4752,7 @@
           <a:p>
             <a:fld id="{8E9833EA-B499-4B94-918E-D984BD10BB08}" type="datetime1">
               <a:rPr lang="en-US" smtClean="0"/>
-              <a:t>6/28/2018</a:t>
+              <a:t>6/29/2018</a:t>
             </a:fld>
             <a:endParaRPr lang="en-US"/>
           </a:p>
@@ -5012,7 +5013,7 @@
           <a:p>
             <a:fld id="{6610645D-284F-4AB1-B5F9-22000907C1A0}" type="datetime1">
               <a:rPr lang="en-US" smtClean="0"/>
-              <a:t>6/28/2018</a:t>
+              <a:t>6/29/2018</a:t>
             </a:fld>
             <a:endParaRPr lang="en-US"/>
           </a:p>
@@ -5203,7 +5204,7 @@
           <a:p>
             <a:fld id="{AD7248DA-6B6E-4F8D-AE00-638A57953181}" type="datetime1">
               <a:rPr lang="en-US" smtClean="0"/>
-              <a:t>6/28/2018</a:t>
+              <a:t>6/29/2018</a:t>
             </a:fld>
             <a:endParaRPr lang="en-US"/>
           </a:p>
@@ -5461,7 +5462,7 @@
           <a:p>
             <a:fld id="{A22459DE-F1A1-4AA1-82A0-0DDB374FAECF}" type="datetime1">
               <a:rPr lang="en-US" smtClean="0"/>
-              <a:t>6/28/2018</a:t>
+              <a:t>6/29/2018</a:t>
             </a:fld>
             <a:endParaRPr lang="en-US"/>
           </a:p>
@@ -5890,7 +5891,7 @@
           <a:p>
             <a:fld id="{CAFDA3D8-C22C-4BC9-999F-ADD3FB83B7A2}" type="datetime1">
               <a:rPr lang="en-US" smtClean="0"/>
-              <a:t>6/28/2018</a:t>
+              <a:t>6/29/2018</a:t>
             </a:fld>
             <a:endParaRPr lang="en-US"/>
           </a:p>
@@ -6431,7 +6432,7 @@
           <a:p>
             <a:fld id="{E6DBB356-F5B5-4231-AAD8-32AE8E471F39}" type="datetime1">
               <a:rPr lang="en-US" smtClean="0"/>
-              <a:t>6/28/2018</a:t>
+              <a:t>6/29/2018</a:t>
             </a:fld>
             <a:endParaRPr lang="en-US"/>
           </a:p>
@@ -7143,7 +7144,7 @@
           <a:p>
             <a:fld id="{EB651CEC-D357-4DCB-B1F5-B5EC0C019F57}" type="datetime1">
               <a:rPr lang="en-US" smtClean="0"/>
-              <a:t>6/28/2018</a:t>
+              <a:t>6/29/2018</a:t>
             </a:fld>
             <a:endParaRPr lang="en-US"/>
           </a:p>
@@ -7308,7 +7309,7 @@
           <a:p>
             <a:fld id="{A2B7646D-50E1-47C0-B998-C8A381FB5F67}" type="datetime1">
               <a:rPr lang="en-US" smtClean="0"/>
-              <a:t>6/28/2018</a:t>
+              <a:t>6/29/2018</a:t>
             </a:fld>
             <a:endParaRPr lang="en-US"/>
           </a:p>
@@ -7483,7 +7484,7 @@
           <a:p>
             <a:fld id="{D984DE5C-F279-48D9-A1F7-4BB183AE550E}" type="datetime1">
               <a:rPr lang="en-US" smtClean="0"/>
-              <a:t>6/28/2018</a:t>
+              <a:t>6/29/2018</a:t>
             </a:fld>
             <a:endParaRPr lang="en-US"/>
           </a:p>
@@ -7648,7 +7649,7 @@
           <a:p>
             <a:fld id="{C61CE57F-0C2C-450A-A479-6AD2DAD52575}" type="datetime1">
               <a:rPr lang="en-US" smtClean="0"/>
-              <a:t>6/28/2018</a:t>
+              <a:t>6/29/2018</a:t>
             </a:fld>
             <a:endParaRPr lang="en-US"/>
           </a:p>
@@ -7893,7 +7894,7 @@
           <a:p>
             <a:fld id="{74892B69-1C83-4FC1-A953-2EE550CA3C4A}" type="datetime1">
               <a:rPr lang="en-US" smtClean="0"/>
-              <a:t>6/28/2018</a:t>
+              <a:t>6/29/2018</a:t>
             </a:fld>
             <a:endParaRPr lang="en-US"/>
           </a:p>
@@ -8120,7 +8121,7 @@
           <a:p>
             <a:fld id="{F6164903-33C4-4BAD-95CE-640001A92676}" type="datetime1">
               <a:rPr lang="en-US" smtClean="0"/>
-              <a:t>6/28/2018</a:t>
+              <a:t>6/29/2018</a:t>
             </a:fld>
             <a:endParaRPr lang="en-US"/>
           </a:p>
@@ -8496,7 +8497,7 @@
           <a:p>
             <a:fld id="{55E335A4-7C35-4974-91B0-A3289D500BA4}" type="datetime1">
               <a:rPr lang="en-US" smtClean="0"/>
-              <a:t>6/28/2018</a:t>
+              <a:t>6/29/2018</a:t>
             </a:fld>
             <a:endParaRPr lang="en-US"/>
           </a:p>
@@ -8609,7 +8610,7 @@
           <a:p>
             <a:fld id="{CDC7960A-D929-4273-9B1E-97AE46B5FD8D}" type="datetime1">
               <a:rPr lang="en-US" smtClean="0"/>
-              <a:t>6/28/2018</a:t>
+              <a:t>6/29/2018</a:t>
             </a:fld>
             <a:endParaRPr lang="en-US"/>
           </a:p>
@@ -8699,7 +8700,7 @@
           <a:p>
             <a:fld id="{AC4DFAE3-FC79-4C56-A2F1-69A863FCF79D}" type="datetime1">
               <a:rPr lang="en-US" smtClean="0"/>
-              <a:t>6/28/2018</a:t>
+              <a:t>6/29/2018</a:t>
             </a:fld>
             <a:endParaRPr lang="en-US"/>
           </a:p>
@@ -8943,7 +8944,7 @@
           <a:p>
             <a:fld id="{D2709FAA-8FAE-4166-93E5-D03333FA4789}" type="datetime1">
               <a:rPr lang="en-US" smtClean="0"/>
-              <a:t>6/28/2018</a:t>
+              <a:t>6/29/2018</a:t>
             </a:fld>
             <a:endParaRPr lang="en-US"/>
           </a:p>
@@ -9217,7 +9218,7 @@
           <a:p>
             <a:fld id="{BE8656EE-7BC9-4553-85C9-65674250F6AB}" type="datetime1">
               <a:rPr lang="en-US" smtClean="0"/>
-              <a:t>6/28/2018</a:t>
+              <a:t>6/29/2018</a:t>
             </a:fld>
             <a:endParaRPr lang="en-US"/>
           </a:p>
@@ -12289,7 +12290,7 @@
           <a:p>
             <a:fld id="{C18CDD4C-9588-4A7D-998F-141A6E2C1A19}" type="datetime1">
               <a:rPr lang="en-US" smtClean="0"/>
-              <a:t>6/28/2018</a:t>
+              <a:t>6/29/2018</a:t>
             </a:fld>
             <a:endParaRPr lang="en-US"/>
           </a:p>
@@ -12836,7 +12837,7 @@
           <a:p>
             <a:r>
               <a:rPr lang="ro-RO"/>
-              <a:t>Concluzii</a:t>
+              <a:t>DEmo</a:t>
             </a:r>
             <a:endParaRPr lang="en-US"/>
           </a:p>
@@ -12857,406 +12858,7 @@
           <a:bodyPr/>
           <a:lstStyle/>
           <a:p>
-            <a:r>
-              <a:rPr lang="en-US" dirty="0" err="1"/>
-              <a:t>Lucrarea</a:t>
-            </a:r>
-            <a:r>
-              <a:rPr lang="en-US" dirty="0"/>
-              <a:t> </a:t>
-            </a:r>
-            <a:r>
-              <a:rPr lang="en-US" dirty="0" err="1"/>
-              <a:t>propusă</a:t>
-            </a:r>
-            <a:r>
-              <a:rPr lang="en-US" dirty="0"/>
-              <a:t> are ca </a:t>
-            </a:r>
-            <a:r>
-              <a:rPr lang="en-US" dirty="0" err="1"/>
-              <a:t>scop</a:t>
-            </a:r>
-            <a:r>
-              <a:rPr lang="en-US" dirty="0"/>
-              <a:t> </a:t>
-            </a:r>
-            <a:r>
-              <a:rPr lang="en-US" dirty="0" err="1"/>
-              <a:t>răspândirea</a:t>
-            </a:r>
-            <a:r>
-              <a:rPr lang="en-US" dirty="0"/>
-              <a:t> </a:t>
-            </a:r>
-            <a:r>
-              <a:rPr lang="en-US" dirty="0" err="1"/>
-              <a:t>recenziilor</a:t>
-            </a:r>
-            <a:r>
-              <a:rPr lang="en-US" dirty="0"/>
-              <a:t> </a:t>
-            </a:r>
-            <a:r>
-              <a:rPr lang="en-US" dirty="0" err="1"/>
-              <a:t>în</a:t>
-            </a:r>
-            <a:r>
-              <a:rPr lang="en-US" dirty="0"/>
-              <a:t> </a:t>
-            </a:r>
-            <a:r>
-              <a:rPr lang="en-US" dirty="0" err="1"/>
-              <a:t>cât</a:t>
-            </a:r>
-            <a:r>
-              <a:rPr lang="en-US" dirty="0"/>
-              <a:t> </a:t>
-            </a:r>
-            <a:r>
-              <a:rPr lang="en-US" dirty="0" err="1"/>
-              <a:t>mai</a:t>
-            </a:r>
-            <a:r>
-              <a:rPr lang="en-US" dirty="0"/>
-              <a:t> </a:t>
-            </a:r>
-            <a:r>
-              <a:rPr lang="en-US" dirty="0" err="1"/>
-              <a:t>multe</a:t>
-            </a:r>
-            <a:r>
-              <a:rPr lang="en-US" dirty="0"/>
-              <a:t> </a:t>
-            </a:r>
-            <a:r>
-              <a:rPr lang="en-US" dirty="0" err="1"/>
-              <a:t>domenii</a:t>
-            </a:r>
-            <a:r>
-              <a:rPr lang="en-US" dirty="0"/>
-              <a:t>, </a:t>
-            </a:r>
-            <a:r>
-              <a:rPr lang="en-US" dirty="0" err="1"/>
-              <a:t>pentru</a:t>
-            </a:r>
-            <a:r>
-              <a:rPr lang="en-US" dirty="0"/>
-              <a:t> a </a:t>
-            </a:r>
-            <a:r>
-              <a:rPr lang="en-US" dirty="0" err="1"/>
-              <a:t>ajuta</a:t>
-            </a:r>
-            <a:r>
-              <a:rPr lang="en-US" dirty="0"/>
-              <a:t> </a:t>
-            </a:r>
-            <a:r>
-              <a:rPr lang="en-US" dirty="0" err="1"/>
-              <a:t>utilizatorii</a:t>
-            </a:r>
-            <a:r>
-              <a:rPr lang="en-US" dirty="0"/>
-              <a:t> </a:t>
-            </a:r>
-            <a:r>
-              <a:rPr lang="en-US" dirty="0" err="1"/>
-              <a:t>să</a:t>
-            </a:r>
-            <a:r>
-              <a:rPr lang="en-US" dirty="0"/>
-              <a:t> </a:t>
-            </a:r>
-            <a:r>
-              <a:rPr lang="en-US" dirty="0" err="1"/>
-              <a:t>poată</a:t>
-            </a:r>
-            <a:r>
-              <a:rPr lang="en-US" dirty="0"/>
-              <a:t> </a:t>
-            </a:r>
-            <a:r>
-              <a:rPr lang="en-US" dirty="0" err="1"/>
-              <a:t>lua</a:t>
-            </a:r>
-            <a:r>
-              <a:rPr lang="en-US" dirty="0"/>
-              <a:t> </a:t>
-            </a:r>
-            <a:r>
-              <a:rPr lang="en-US" dirty="0" err="1"/>
-              <a:t>decizii</a:t>
-            </a:r>
-            <a:r>
-              <a:rPr lang="en-US" dirty="0"/>
-              <a:t> </a:t>
-            </a:r>
-            <a:r>
-              <a:rPr lang="en-US" dirty="0" err="1"/>
-              <a:t>mai</a:t>
-            </a:r>
-            <a:r>
-              <a:rPr lang="en-US" dirty="0"/>
-              <a:t> </a:t>
-            </a:r>
-            <a:r>
-              <a:rPr lang="en-US" dirty="0" err="1"/>
-              <a:t>ușor</a:t>
-            </a:r>
-            <a:r>
-              <a:rPr lang="ro-RO" dirty="0"/>
-              <a:t>, nu doar la alegerea unor produse, cât si la anumite servicii.</a:t>
-            </a:r>
-            <a:endParaRPr lang="en-US" dirty="0"/>
-          </a:p>
-          <a:p>
-            <a:pPr marL="0" indent="0">
-              <a:buNone/>
-            </a:pPr>
-            <a:endParaRPr lang="en-US" dirty="0"/>
-          </a:p>
-          <a:p>
-            <a:r>
-              <a:rPr lang="en-US" dirty="0" err="1"/>
-              <a:t>Ușurează</a:t>
-            </a:r>
-            <a:r>
-              <a:rPr lang="en-US" dirty="0"/>
-              <a:t> </a:t>
-            </a:r>
-            <a:r>
-              <a:rPr lang="en-US" dirty="0" err="1"/>
-              <a:t>procesul</a:t>
-            </a:r>
-            <a:r>
-              <a:rPr lang="en-US" dirty="0"/>
-              <a:t> de </a:t>
-            </a:r>
-            <a:r>
-              <a:rPr lang="en-US" dirty="0" err="1"/>
-              <a:t>alegere</a:t>
-            </a:r>
-            <a:r>
-              <a:rPr lang="en-US" dirty="0"/>
-              <a:t> </a:t>
-            </a:r>
-            <a:r>
-              <a:rPr lang="en-US" dirty="0" err="1"/>
-              <a:t>și</a:t>
-            </a:r>
-            <a:r>
-              <a:rPr lang="en-US" dirty="0"/>
-              <a:t> </a:t>
-            </a:r>
-            <a:r>
-              <a:rPr lang="en-US" dirty="0" err="1"/>
-              <a:t>evaluare</a:t>
-            </a:r>
-            <a:r>
-              <a:rPr lang="en-US" dirty="0"/>
-              <a:t> a </a:t>
-            </a:r>
-            <a:r>
-              <a:rPr lang="en-US" dirty="0" err="1"/>
-              <a:t>unei</a:t>
-            </a:r>
-            <a:r>
-              <a:rPr lang="en-US" dirty="0"/>
-              <a:t> </a:t>
-            </a:r>
-            <a:r>
-              <a:rPr lang="en-US" dirty="0" err="1"/>
-              <a:t>firme</a:t>
-            </a:r>
-            <a:r>
-              <a:rPr lang="en-US" dirty="0"/>
-              <a:t>, </a:t>
-            </a:r>
-            <a:r>
-              <a:rPr lang="en-US" dirty="0" err="1"/>
-              <a:t>punând</a:t>
-            </a:r>
-            <a:r>
-              <a:rPr lang="en-US" dirty="0"/>
-              <a:t> la </a:t>
-            </a:r>
-            <a:r>
-              <a:rPr lang="en-US" dirty="0" err="1"/>
-              <a:t>dispoziție</a:t>
-            </a:r>
-            <a:r>
-              <a:rPr lang="en-US" dirty="0"/>
-              <a:t> </a:t>
-            </a:r>
-            <a:r>
-              <a:rPr lang="en-US" dirty="0" err="1"/>
-              <a:t>utilizatorilor</a:t>
-            </a:r>
-            <a:r>
-              <a:rPr lang="en-US" dirty="0"/>
-              <a:t> </a:t>
-            </a:r>
-            <a:r>
-              <a:rPr lang="en-US" dirty="0" err="1"/>
-              <a:t>lista</a:t>
-            </a:r>
-            <a:r>
-              <a:rPr lang="en-US" dirty="0"/>
-              <a:t> de </a:t>
-            </a:r>
-            <a:r>
-              <a:rPr lang="en-US" dirty="0" err="1"/>
-              <a:t>firme</a:t>
-            </a:r>
-            <a:r>
-              <a:rPr lang="en-US" dirty="0"/>
-              <a:t> </a:t>
-            </a:r>
-            <a:r>
-              <a:rPr lang="en-US" dirty="0" err="1"/>
-              <a:t>și</a:t>
-            </a:r>
-            <a:r>
-              <a:rPr lang="en-US" dirty="0"/>
-              <a:t> review-</a:t>
-            </a:r>
-            <a:r>
-              <a:rPr lang="en-US" dirty="0" err="1"/>
-              <a:t>urile</a:t>
-            </a:r>
-            <a:r>
-              <a:rPr lang="en-US" dirty="0"/>
-              <a:t> </a:t>
-            </a:r>
-            <a:r>
-              <a:rPr lang="en-US" dirty="0" err="1"/>
-              <a:t>aferente</a:t>
-            </a:r>
-            <a:r>
-              <a:rPr lang="en-US" dirty="0"/>
-              <a:t> </a:t>
-            </a:r>
-            <a:r>
-              <a:rPr lang="en-US" dirty="0" err="1"/>
-              <a:t>acestora</a:t>
-            </a:r>
-            <a:r>
-              <a:rPr lang="en-US" dirty="0"/>
-              <a:t> </a:t>
-            </a:r>
-            <a:r>
-              <a:rPr lang="en-US" dirty="0" err="1"/>
-              <a:t>într</a:t>
-            </a:r>
-            <a:r>
-              <a:rPr lang="en-US" dirty="0"/>
-              <a:t>-un </a:t>
-            </a:r>
-            <a:r>
-              <a:rPr lang="en-US" dirty="0" err="1"/>
-              <a:t>singur</a:t>
-            </a:r>
-            <a:r>
-              <a:rPr lang="en-US" dirty="0"/>
-              <a:t> </a:t>
-            </a:r>
-            <a:r>
-              <a:rPr lang="en-US" dirty="0" err="1"/>
-              <a:t>loc</a:t>
-            </a:r>
-            <a:r>
-              <a:rPr lang="en-US" dirty="0"/>
-              <a:t> </a:t>
-            </a:r>
-            <a:r>
-              <a:rPr lang="en-US" dirty="0" err="1"/>
-              <a:t>organizat</a:t>
-            </a:r>
-            <a:r>
-              <a:rPr lang="en-US" dirty="0"/>
-              <a:t>, </a:t>
-            </a:r>
-            <a:r>
-              <a:rPr lang="en-US" dirty="0" err="1"/>
-              <a:t>fără</a:t>
-            </a:r>
-            <a:r>
-              <a:rPr lang="en-US" dirty="0"/>
-              <a:t> ca </a:t>
-            </a:r>
-            <a:r>
-              <a:rPr lang="en-US" dirty="0" err="1"/>
-              <a:t>aceștia</a:t>
-            </a:r>
-            <a:r>
-              <a:rPr lang="en-US" dirty="0"/>
-              <a:t> </a:t>
-            </a:r>
-            <a:r>
-              <a:rPr lang="en-US" dirty="0" err="1"/>
-              <a:t>să</a:t>
-            </a:r>
-            <a:r>
-              <a:rPr lang="en-US" dirty="0"/>
-              <a:t> </a:t>
-            </a:r>
-            <a:r>
-              <a:rPr lang="en-US" dirty="0" err="1"/>
-              <a:t>intre</a:t>
-            </a:r>
-            <a:r>
-              <a:rPr lang="en-US" dirty="0"/>
-              <a:t> </a:t>
-            </a:r>
-            <a:r>
-              <a:rPr lang="en-US" dirty="0" err="1"/>
-              <a:t>pe</a:t>
-            </a:r>
-            <a:r>
-              <a:rPr lang="en-US" dirty="0"/>
-              <a:t> </a:t>
-            </a:r>
-            <a:r>
-              <a:rPr lang="en-US" dirty="0" err="1"/>
-              <a:t>pagina</a:t>
-            </a:r>
-            <a:r>
-              <a:rPr lang="en-US" dirty="0"/>
-              <a:t> </a:t>
-            </a:r>
-            <a:r>
-              <a:rPr lang="en-US" dirty="0" err="1"/>
-              <a:t>fiecărei</a:t>
-            </a:r>
-            <a:r>
-              <a:rPr lang="en-US" dirty="0"/>
-              <a:t> </a:t>
-            </a:r>
-            <a:r>
-              <a:rPr lang="en-US" dirty="0" err="1"/>
-              <a:t>firme</a:t>
-            </a:r>
-            <a:r>
-              <a:rPr lang="en-US" dirty="0"/>
-              <a:t> </a:t>
-            </a:r>
-            <a:r>
-              <a:rPr lang="en-US" dirty="0" err="1"/>
-              <a:t>în</a:t>
-            </a:r>
-            <a:r>
-              <a:rPr lang="en-US" dirty="0"/>
-              <a:t> parte;</a:t>
-            </a:r>
-            <a:endParaRPr lang="ro-RO" dirty="0"/>
-          </a:p>
-          <a:p>
-            <a:pPr marL="0" indent="0">
-              <a:buNone/>
-            </a:pPr>
-            <a:endParaRPr lang="en-US" dirty="0"/>
+            <a:endParaRPr lang="en-US"/>
           </a:p>
         </p:txBody>
       </p:sp>
@@ -13265,7 +12867,7 @@
           <p:cNvPr id="4" name="Slide Number Placeholder 3">
             <a:extLst>
               <a:ext uri="{FF2B5EF4-FFF2-40B4-BE49-F238E27FC236}">
-                <a16:creationId xmlns:a16="http://schemas.microsoft.com/office/drawing/2014/main" id="{77590E5B-5441-4CE2-9E86-9F84D7FC2405}"/>
+                <a16:creationId xmlns:a16="http://schemas.microsoft.com/office/drawing/2014/main" id="{D6E04812-7890-41C0-B4D9-A5E2F5ACD91F}"/>
               </a:ext>
             </a:extLst>
           </p:cNvPr>
@@ -13292,7 +12894,7 @@
     </p:spTree>
     <p:extLst>
       <p:ext uri="{BB962C8B-B14F-4D97-AF65-F5344CB8AC3E}">
-        <p14:creationId xmlns:p14="http://schemas.microsoft.com/office/powerpoint/2010/main" val="3867043240"/>
+        <p14:creationId xmlns:p14="http://schemas.microsoft.com/office/powerpoint/2010/main" val="4180818445"/>
       </p:ext>
     </p:extLst>
   </p:cSld>
@@ -13335,10 +12937,10 @@
           <a:lstStyle/>
           <a:p>
             <a:r>
-              <a:rPr lang="en-US" dirty="0" err="1"/>
+              <a:rPr lang="ro-RO"/>
               <a:t>Concluzii</a:t>
             </a:r>
-            <a:endParaRPr lang="en-US" dirty="0"/>
+            <a:endParaRPr lang="en-US"/>
           </a:p>
         </p:txBody>
       </p:sp>
@@ -13354,400 +12956,411 @@
         </p:nvSpPr>
         <p:spPr/>
         <p:txBody>
-          <a:bodyPr/>
+          <a:bodyPr>
+            <a:normAutofit/>
+          </a:bodyPr>
           <a:lstStyle/>
           <a:p>
             <a:r>
-              <a:rPr lang="en-US" dirty="0"/>
-              <a:t>Plan de </a:t>
-            </a:r>
-            <a:r>
-              <a:rPr lang="en-US" dirty="0" err="1"/>
-              <a:t>imbunatatire</a:t>
-            </a:r>
-            <a:endParaRPr lang="en-US" dirty="0"/>
-          </a:p>
-          <a:p>
-            <a:pPr lvl="1"/>
-            <a:r>
-              <a:rPr lang="en-US" dirty="0" err="1"/>
-              <a:t>Pentru</a:t>
-            </a:r>
-            <a:r>
-              <a:rPr lang="en-US" dirty="0"/>
+              <a:rPr lang="en-US" sz="2000" dirty="0" err="1"/>
+              <a:t>Lucrarea</a:t>
+            </a:r>
+            <a:r>
+              <a:rPr lang="en-US" sz="2000" dirty="0"/>
+              <a:t> </a:t>
+            </a:r>
+            <a:r>
+              <a:rPr lang="en-US" sz="2000" dirty="0" err="1"/>
+              <a:t>propusă</a:t>
+            </a:r>
+            <a:r>
+              <a:rPr lang="en-US" sz="2000" dirty="0"/>
+              <a:t> are ca </a:t>
+            </a:r>
+            <a:r>
+              <a:rPr lang="en-US" sz="2000" dirty="0" err="1"/>
+              <a:t>scop</a:t>
+            </a:r>
+            <a:r>
+              <a:rPr lang="en-US" sz="2000" dirty="0"/>
+              <a:t> </a:t>
+            </a:r>
+            <a:r>
+              <a:rPr lang="en-US" sz="2000" dirty="0" err="1"/>
+              <a:t>răspândirea</a:t>
+            </a:r>
+            <a:r>
+              <a:rPr lang="en-US" sz="2000" dirty="0"/>
+              <a:t> </a:t>
+            </a:r>
+            <a:r>
+              <a:rPr lang="en-US" sz="2000" dirty="0" err="1"/>
+              <a:t>recenziilor</a:t>
+            </a:r>
+            <a:r>
+              <a:rPr lang="en-US" sz="2000" dirty="0"/>
+              <a:t> </a:t>
+            </a:r>
+            <a:r>
+              <a:rPr lang="en-US" sz="2000" dirty="0" err="1"/>
+              <a:t>în</a:t>
+            </a:r>
+            <a:r>
+              <a:rPr lang="en-US" sz="2000" dirty="0"/>
+              <a:t> </a:t>
+            </a:r>
+            <a:r>
+              <a:rPr lang="en-US" sz="2000" dirty="0" err="1"/>
+              <a:t>cât</a:t>
+            </a:r>
+            <a:r>
+              <a:rPr lang="en-US" sz="2000" dirty="0"/>
+              <a:t> </a:t>
+            </a:r>
+            <a:r>
+              <a:rPr lang="en-US" sz="2000" dirty="0" err="1"/>
+              <a:t>mai</a:t>
+            </a:r>
+            <a:r>
+              <a:rPr lang="en-US" sz="2000" dirty="0"/>
+              <a:t> </a:t>
+            </a:r>
+            <a:r>
+              <a:rPr lang="en-US" sz="2000" dirty="0" err="1"/>
+              <a:t>multe</a:t>
+            </a:r>
+            <a:r>
+              <a:rPr lang="en-US" sz="2000" dirty="0"/>
+              <a:t> </a:t>
+            </a:r>
+            <a:r>
+              <a:rPr lang="en-US" sz="2000" dirty="0" err="1"/>
+              <a:t>domenii</a:t>
+            </a:r>
+            <a:r>
+              <a:rPr lang="en-US" sz="2000" dirty="0"/>
+              <a:t>, </a:t>
+            </a:r>
+            <a:r>
+              <a:rPr lang="en-US" sz="2000" dirty="0" err="1"/>
+              <a:t>pentru</a:t>
+            </a:r>
+            <a:r>
+              <a:rPr lang="en-US" sz="2000" dirty="0"/>
               <a:t> a </a:t>
             </a:r>
             <a:r>
-              <a:rPr lang="en-US" dirty="0" err="1"/>
-              <a:t>optimiza</a:t>
-            </a:r>
-            <a:r>
-              <a:rPr lang="en-US" dirty="0"/>
+              <a:rPr lang="en-US" sz="2000" dirty="0" err="1"/>
+              <a:t>ajuta</a:t>
+            </a:r>
+            <a:r>
+              <a:rPr lang="en-US" sz="2000" dirty="0"/>
               <a:t> </a:t>
             </a:r>
             <a:r>
-              <a:rPr lang="en-US" dirty="0" err="1"/>
-              <a:t>aplicația</a:t>
-            </a:r>
-            <a:r>
-              <a:rPr lang="en-US" dirty="0"/>
-              <a:t>, m-am </a:t>
-            </a:r>
-            <a:r>
-              <a:rPr lang="en-US" dirty="0" err="1"/>
-              <a:t>gândit</a:t>
-            </a:r>
-            <a:r>
-              <a:rPr lang="en-US" dirty="0"/>
-              <a:t> la o </a:t>
-            </a:r>
-            <a:r>
-              <a:rPr lang="en-US" dirty="0" err="1"/>
-              <a:t>îmbunătățire</a:t>
-            </a:r>
-            <a:r>
-              <a:rPr lang="en-US" dirty="0"/>
+              <a:rPr lang="en-US" sz="2000" dirty="0" err="1"/>
+              <a:t>utilizatorii</a:t>
+            </a:r>
+            <a:r>
+              <a:rPr lang="en-US" sz="2000" dirty="0"/>
+              <a:t> </a:t>
+            </a:r>
+            <a:r>
+              <a:rPr lang="en-US" sz="2000" dirty="0" err="1"/>
+              <a:t>să</a:t>
+            </a:r>
+            <a:r>
+              <a:rPr lang="en-US" sz="2000" dirty="0"/>
+              <a:t> </a:t>
+            </a:r>
+            <a:r>
+              <a:rPr lang="en-US" sz="2000" dirty="0" err="1"/>
+              <a:t>poată</a:t>
+            </a:r>
+            <a:r>
+              <a:rPr lang="en-US" sz="2000" dirty="0"/>
+              <a:t> </a:t>
+            </a:r>
+            <a:r>
+              <a:rPr lang="en-US" sz="2000" dirty="0" err="1"/>
+              <a:t>lua</a:t>
+            </a:r>
+            <a:r>
+              <a:rPr lang="en-US" sz="2000" dirty="0"/>
+              <a:t> </a:t>
+            </a:r>
+            <a:r>
+              <a:rPr lang="en-US" sz="2000" dirty="0" err="1"/>
+              <a:t>decizii</a:t>
+            </a:r>
+            <a:r>
+              <a:rPr lang="en-US" sz="2000" dirty="0"/>
+              <a:t> </a:t>
+            </a:r>
+            <a:r>
+              <a:rPr lang="en-US" sz="2000" dirty="0" err="1"/>
+              <a:t>mai</a:t>
+            </a:r>
+            <a:r>
+              <a:rPr lang="en-US" sz="2000" dirty="0"/>
+              <a:t> </a:t>
+            </a:r>
+            <a:r>
+              <a:rPr lang="en-US" sz="2000" dirty="0" err="1"/>
+              <a:t>ușor</a:t>
+            </a:r>
+            <a:r>
+              <a:rPr lang="ro-RO" sz="2000" dirty="0"/>
+              <a:t>, nu doar la alegerea unor produse, cât si la anumite servicii.</a:t>
+            </a:r>
+            <a:endParaRPr lang="en-US" sz="2000" dirty="0"/>
+          </a:p>
+          <a:p>
+            <a:pPr marL="0" indent="0">
+              <a:buNone/>
+            </a:pPr>
+            <a:endParaRPr lang="en-US" sz="2000" dirty="0"/>
+          </a:p>
+          <a:p>
+            <a:r>
+              <a:rPr lang="en-US" sz="2000" dirty="0" err="1"/>
+              <a:t>Ușurează</a:t>
+            </a:r>
+            <a:r>
+              <a:rPr lang="en-US" sz="2000" dirty="0"/>
+              <a:t> </a:t>
+            </a:r>
+            <a:r>
+              <a:rPr lang="en-US" sz="2000" dirty="0" err="1"/>
+              <a:t>procesul</a:t>
+            </a:r>
+            <a:r>
+              <a:rPr lang="en-US" sz="2000" dirty="0"/>
+              <a:t> de </a:t>
+            </a:r>
+            <a:r>
+              <a:rPr lang="en-US" sz="2000" dirty="0" err="1"/>
+              <a:t>alegere</a:t>
+            </a:r>
+            <a:r>
+              <a:rPr lang="en-US" sz="2000" dirty="0"/>
+              <a:t> </a:t>
+            </a:r>
+            <a:r>
+              <a:rPr lang="en-US" sz="2000" dirty="0" err="1"/>
+              <a:t>și</a:t>
+            </a:r>
+            <a:r>
+              <a:rPr lang="en-US" sz="2000" dirty="0"/>
+              <a:t> </a:t>
+            </a:r>
+            <a:r>
+              <a:rPr lang="en-US" sz="2000" dirty="0" err="1"/>
+              <a:t>evaluare</a:t>
+            </a:r>
+            <a:r>
+              <a:rPr lang="en-US" sz="2000" dirty="0"/>
               <a:t> a </a:t>
             </a:r>
             <a:r>
-              <a:rPr lang="en-US" dirty="0" err="1"/>
-              <a:t>algoritmului</a:t>
-            </a:r>
-            <a:r>
-              <a:rPr lang="en-US" dirty="0"/>
+              <a:rPr lang="en-US" sz="2000" dirty="0" err="1"/>
+              <a:t>unei</a:t>
+            </a:r>
+            <a:r>
+              <a:rPr lang="en-US" sz="2000" dirty="0"/>
+              <a:t> </a:t>
+            </a:r>
+            <a:r>
+              <a:rPr lang="en-US" sz="2000" dirty="0" err="1"/>
+              <a:t>firme</a:t>
+            </a:r>
+            <a:r>
+              <a:rPr lang="en-US" sz="2000" dirty="0"/>
+              <a:t>, </a:t>
+            </a:r>
+            <a:r>
+              <a:rPr lang="en-US" sz="2000" dirty="0" err="1"/>
+              <a:t>punând</a:t>
+            </a:r>
+            <a:r>
+              <a:rPr lang="en-US" sz="2000" dirty="0"/>
+              <a:t> la </a:t>
+            </a:r>
+            <a:r>
+              <a:rPr lang="en-US" sz="2000" dirty="0" err="1"/>
+              <a:t>dispoziție</a:t>
+            </a:r>
+            <a:r>
+              <a:rPr lang="en-US" sz="2000" dirty="0"/>
+              <a:t> </a:t>
+            </a:r>
+            <a:r>
+              <a:rPr lang="en-US" sz="2000" dirty="0" err="1"/>
+              <a:t>utilizatorilor</a:t>
+            </a:r>
+            <a:r>
+              <a:rPr lang="en-US" sz="2000" dirty="0"/>
+              <a:t> </a:t>
+            </a:r>
+            <a:r>
+              <a:rPr lang="en-US" sz="2000" dirty="0" err="1"/>
+              <a:t>lista</a:t>
+            </a:r>
+            <a:r>
+              <a:rPr lang="en-US" sz="2000" dirty="0"/>
               <a:t> de </a:t>
             </a:r>
             <a:r>
-              <a:rPr lang="en-US" dirty="0" err="1"/>
-              <a:t>învățare</a:t>
-            </a:r>
-            <a:r>
-              <a:rPr lang="en-US" dirty="0"/>
+              <a:rPr lang="en-US" sz="2000" dirty="0" err="1"/>
+              <a:t>firme</a:t>
+            </a:r>
+            <a:r>
+              <a:rPr lang="en-US" sz="2000" dirty="0"/>
               <a:t> </a:t>
             </a:r>
             <a:r>
-              <a:rPr lang="en-US" dirty="0" err="1"/>
-              <a:t>automată</a:t>
-            </a:r>
-            <a:r>
-              <a:rPr lang="en-US" dirty="0"/>
+              <a:rPr lang="en-US" sz="2000" dirty="0" err="1"/>
+              <a:t>și</a:t>
+            </a:r>
+            <a:r>
+              <a:rPr lang="en-US" sz="2000" dirty="0"/>
+              <a:t> review-</a:t>
+            </a:r>
+            <a:r>
+              <a:rPr lang="en-US" sz="2000" dirty="0" err="1"/>
+              <a:t>urile</a:t>
+            </a:r>
+            <a:r>
+              <a:rPr lang="en-US" sz="2000" dirty="0"/>
+              <a:t> </a:t>
+            </a:r>
+            <a:r>
+              <a:rPr lang="en-US" sz="2000" dirty="0" err="1"/>
+              <a:t>aferente</a:t>
+            </a:r>
+            <a:r>
+              <a:rPr lang="en-US" sz="2000" dirty="0"/>
+              <a:t> </a:t>
+            </a:r>
+            <a:r>
+              <a:rPr lang="en-US" sz="2000" dirty="0" err="1"/>
+              <a:t>acestora</a:t>
+            </a:r>
+            <a:r>
+              <a:rPr lang="en-US" sz="2000" dirty="0"/>
+              <a:t> </a:t>
+            </a:r>
+            <a:r>
+              <a:rPr lang="en-US" sz="2000" dirty="0" err="1"/>
+              <a:t>într</a:t>
+            </a:r>
+            <a:r>
+              <a:rPr lang="en-US" sz="2000" dirty="0"/>
+              <a:t>-un </a:t>
+            </a:r>
+            <a:r>
+              <a:rPr lang="en-US" sz="2000" dirty="0" err="1"/>
+              <a:t>singur</a:t>
+            </a:r>
+            <a:r>
+              <a:rPr lang="en-US" sz="2000" dirty="0"/>
+              <a:t> </a:t>
+            </a:r>
+            <a:r>
+              <a:rPr lang="en-US" sz="2000" dirty="0" err="1"/>
+              <a:t>loc</a:t>
+            </a:r>
+            <a:r>
+              <a:rPr lang="en-US" sz="2000" dirty="0"/>
+              <a:t> </a:t>
+            </a:r>
+            <a:r>
+              <a:rPr lang="en-US" sz="2000" dirty="0" err="1"/>
+              <a:t>organizat</a:t>
+            </a:r>
+            <a:r>
+              <a:rPr lang="en-US" sz="2000" dirty="0"/>
               <a:t>, </a:t>
             </a:r>
             <a:r>
-              <a:rPr lang="en-US" dirty="0" err="1"/>
-              <a:t>prin</a:t>
-            </a:r>
-            <a:r>
-              <a:rPr lang="en-US" dirty="0"/>
+              <a:rPr lang="en-US" sz="2000" dirty="0" err="1"/>
+              <a:t>fără</a:t>
+            </a:r>
+            <a:r>
+              <a:rPr lang="en-US" sz="2000" dirty="0"/>
+              <a:t> ca </a:t>
+            </a:r>
+            <a:r>
+              <a:rPr lang="en-US" sz="2000" dirty="0" err="1"/>
+              <a:t>aceștia</a:t>
+            </a:r>
+            <a:r>
+              <a:rPr lang="en-US" sz="2000" dirty="0"/>
               <a:t> </a:t>
             </a:r>
             <a:r>
-              <a:rPr lang="en-US" dirty="0" err="1"/>
-              <a:t>aplicarea</a:t>
-            </a:r>
-            <a:r>
-              <a:rPr lang="en-US" dirty="0"/>
+              <a:rPr lang="en-US" sz="2000" dirty="0" err="1"/>
+              <a:t>să</a:t>
+            </a:r>
+            <a:r>
+              <a:rPr lang="en-US" sz="2000" dirty="0"/>
               <a:t> </a:t>
             </a:r>
             <a:r>
-              <a:rPr lang="en-US" dirty="0" err="1"/>
-              <a:t>sa</a:t>
-            </a:r>
-            <a:r>
-              <a:rPr lang="en-US" dirty="0"/>
-              <a:t> la un set de date de </a:t>
-            </a:r>
-            <a:r>
-              <a:rPr lang="en-US" dirty="0" err="1"/>
-              <a:t>antrenament</a:t>
-            </a:r>
-            <a:r>
-              <a:rPr lang="en-US" dirty="0"/>
+              <a:rPr lang="en-US" sz="2000" dirty="0" err="1"/>
+              <a:t>intre</a:t>
+            </a:r>
+            <a:r>
+              <a:rPr lang="en-US" sz="2000" dirty="0"/>
               <a:t> </a:t>
             </a:r>
             <a:r>
-              <a:rPr lang="en-US" dirty="0" err="1"/>
-              <a:t>mult</a:t>
-            </a:r>
-            <a:r>
-              <a:rPr lang="en-US" dirty="0"/>
+              <a:rPr lang="en-US" sz="2000" dirty="0" err="1"/>
+              <a:t>pe</a:t>
+            </a:r>
+            <a:r>
+              <a:rPr lang="en-US" sz="2000" dirty="0"/>
               <a:t> </a:t>
             </a:r>
             <a:r>
-              <a:rPr lang="en-US" dirty="0" err="1"/>
-              <a:t>mai</a:t>
-            </a:r>
-            <a:r>
-              <a:rPr lang="en-US" dirty="0"/>
-              <a:t> ample, </a:t>
-            </a:r>
-            <a:r>
-              <a:rPr lang="en-US" dirty="0" err="1"/>
-              <a:t>crescând</a:t>
-            </a:r>
-            <a:r>
-              <a:rPr lang="en-US" dirty="0"/>
+              <a:rPr lang="en-US" sz="2000" dirty="0" err="1"/>
+              <a:t>pagina</a:t>
+            </a:r>
+            <a:r>
+              <a:rPr lang="en-US" sz="2000" dirty="0"/>
               <a:t> </a:t>
             </a:r>
             <a:r>
-              <a:rPr lang="en-US" dirty="0" err="1"/>
-              <a:t>altfel</a:t>
-            </a:r>
-            <a:r>
-              <a:rPr lang="en-US" dirty="0"/>
+              <a:rPr lang="en-US" sz="2000" dirty="0" err="1"/>
+              <a:t>fiecărei</a:t>
+            </a:r>
+            <a:r>
+              <a:rPr lang="en-US" sz="2000" dirty="0"/>
               <a:t> </a:t>
             </a:r>
             <a:r>
-              <a:rPr lang="en-US" dirty="0" err="1"/>
-              <a:t>probabilitatea</a:t>
-            </a:r>
-            <a:r>
-              <a:rPr lang="en-US" dirty="0"/>
+              <a:rPr lang="en-US" sz="2000" dirty="0" err="1"/>
+              <a:t>firme</a:t>
+            </a:r>
+            <a:r>
+              <a:rPr lang="en-US" sz="2000" dirty="0"/>
               <a:t> </a:t>
             </a:r>
             <a:r>
-              <a:rPr lang="en-US" dirty="0" err="1"/>
-              <a:t>unei</a:t>
-            </a:r>
-            <a:r>
-              <a:rPr lang="en-US" dirty="0"/>
-              <a:t> </a:t>
-            </a:r>
-            <a:r>
-              <a:rPr lang="en-US" dirty="0" err="1"/>
-              <a:t>clasificări</a:t>
-            </a:r>
-            <a:r>
-              <a:rPr lang="en-US" dirty="0"/>
-              <a:t> </a:t>
-            </a:r>
-            <a:r>
-              <a:rPr lang="en-US" dirty="0" err="1"/>
-              <a:t>cât</a:t>
-            </a:r>
-            <a:r>
-              <a:rPr lang="en-US" dirty="0"/>
-              <a:t> </a:t>
-            </a:r>
-            <a:r>
-              <a:rPr lang="en-US" dirty="0" err="1"/>
-              <a:t>mai</a:t>
-            </a:r>
-            <a:r>
-              <a:rPr lang="en-US" dirty="0"/>
-              <a:t> </a:t>
-            </a:r>
-            <a:r>
-              <a:rPr lang="en-US" dirty="0" err="1"/>
-              <a:t>corecte</a:t>
-            </a:r>
-            <a:r>
-              <a:rPr lang="en-US" dirty="0"/>
-              <a:t>.</a:t>
-            </a:r>
-          </a:p>
-          <a:p>
-            <a:pPr lvl="1"/>
-            <a:r>
-              <a:rPr lang="en-US" dirty="0" err="1"/>
-              <a:t>Pentru</a:t>
-            </a:r>
-            <a:r>
-              <a:rPr lang="en-US" dirty="0"/>
-              <a:t> a-</a:t>
-            </a:r>
-            <a:r>
-              <a:rPr lang="en-US" dirty="0" err="1"/>
-              <a:t>i</a:t>
-            </a:r>
-            <a:r>
-              <a:rPr lang="en-US" dirty="0"/>
-              <a:t> </a:t>
-            </a:r>
-            <a:r>
-              <a:rPr lang="en-US" dirty="0" err="1"/>
-              <a:t>crește</a:t>
-            </a:r>
-            <a:r>
-              <a:rPr lang="en-US" dirty="0"/>
-              <a:t> </a:t>
-            </a:r>
-            <a:r>
-              <a:rPr lang="en-US" dirty="0" err="1"/>
-              <a:t>popularitatea</a:t>
-            </a:r>
-            <a:r>
-              <a:rPr lang="en-US" dirty="0"/>
-              <a:t>, </a:t>
-            </a:r>
-            <a:r>
-              <a:rPr lang="en-US" dirty="0" err="1"/>
-              <a:t>aplicația</a:t>
-            </a:r>
-            <a:r>
-              <a:rPr lang="en-US" dirty="0"/>
-              <a:t> </a:t>
-            </a:r>
-            <a:r>
-              <a:rPr lang="en-US" dirty="0" err="1"/>
-              <a:t>poate</a:t>
-            </a:r>
-            <a:r>
-              <a:rPr lang="en-US" dirty="0"/>
-              <a:t> fi </a:t>
-            </a:r>
-            <a:r>
-              <a:rPr lang="en-US" dirty="0" err="1"/>
-              <a:t>extinsă</a:t>
-            </a:r>
-            <a:r>
-              <a:rPr lang="en-US" dirty="0"/>
-              <a:t> </a:t>
-            </a:r>
-            <a:r>
-              <a:rPr lang="en-US" dirty="0" err="1"/>
-              <a:t>și</a:t>
-            </a:r>
-            <a:r>
-              <a:rPr lang="en-US" dirty="0"/>
-              <a:t> la </a:t>
-            </a:r>
-            <a:r>
-              <a:rPr lang="en-US" dirty="0" err="1"/>
-              <a:t>alte</a:t>
-            </a:r>
-            <a:r>
-              <a:rPr lang="en-US" dirty="0"/>
-              <a:t> </a:t>
-            </a:r>
-            <a:r>
-              <a:rPr lang="en-US" dirty="0" err="1"/>
-              <a:t>culturi</a:t>
-            </a:r>
-            <a:r>
-              <a:rPr lang="en-US" dirty="0"/>
-              <a:t>, </a:t>
-            </a:r>
-            <a:r>
-              <a:rPr lang="en-US" dirty="0" err="1"/>
-              <a:t>să</a:t>
-            </a:r>
-            <a:r>
-              <a:rPr lang="en-US" dirty="0"/>
-              <a:t> </a:t>
-            </a:r>
-            <a:r>
-              <a:rPr lang="en-US" dirty="0" err="1"/>
-              <a:t>conțină</a:t>
-            </a:r>
-            <a:r>
-              <a:rPr lang="en-US" dirty="0"/>
-              <a:t> </a:t>
-            </a:r>
-            <a:r>
-              <a:rPr lang="en-US" dirty="0" err="1"/>
-              <a:t>firme</a:t>
-            </a:r>
-            <a:r>
-              <a:rPr lang="en-US" dirty="0"/>
-              <a:t> din </a:t>
-            </a:r>
-            <a:r>
-              <a:rPr lang="en-US" dirty="0" err="1"/>
-              <a:t>mai</a:t>
-            </a:r>
-            <a:r>
-              <a:rPr lang="en-US" dirty="0"/>
-              <a:t> </a:t>
-            </a:r>
-            <a:r>
-              <a:rPr lang="en-US" dirty="0" err="1"/>
-              <a:t>multe</a:t>
-            </a:r>
-            <a:r>
-              <a:rPr lang="en-US" dirty="0"/>
-              <a:t> </a:t>
-            </a:r>
-            <a:r>
-              <a:rPr lang="en-US" dirty="0" err="1"/>
-              <a:t>țări</a:t>
-            </a:r>
-            <a:r>
-              <a:rPr lang="en-US" dirty="0"/>
-              <a:t>, </a:t>
-            </a:r>
-            <a:r>
-              <a:rPr lang="en-US" dirty="0" err="1"/>
-              <a:t>și</a:t>
-            </a:r>
-            <a:r>
-              <a:rPr lang="en-US" dirty="0"/>
-              <a:t> </a:t>
-            </a:r>
-            <a:r>
-              <a:rPr lang="en-US" dirty="0" err="1"/>
+              <a:rPr lang="en-US" sz="2000" dirty="0" err="1"/>
               <a:t>în</a:t>
             </a:r>
             <a:r>
-              <a:rPr lang="en-US" dirty="0"/>
-              <a:t> </a:t>
-            </a:r>
-            <a:r>
-              <a:rPr lang="en-US" dirty="0" err="1"/>
-              <a:t>funcție</a:t>
-            </a:r>
-            <a:r>
-              <a:rPr lang="en-US" dirty="0"/>
-              <a:t> de </a:t>
-            </a:r>
-            <a:r>
-              <a:rPr lang="en-US" dirty="0" err="1"/>
-              <a:t>locație</a:t>
-            </a:r>
-            <a:r>
-              <a:rPr lang="en-US" dirty="0"/>
-              <a:t>, </a:t>
-            </a:r>
-            <a:r>
-              <a:rPr lang="en-US" dirty="0" err="1"/>
-              <a:t>aplicația</a:t>
-            </a:r>
-            <a:r>
-              <a:rPr lang="en-US" dirty="0"/>
-              <a:t> </a:t>
-            </a:r>
-            <a:r>
-              <a:rPr lang="en-US" dirty="0" err="1"/>
-              <a:t>să</a:t>
-            </a:r>
-            <a:r>
-              <a:rPr lang="en-US" dirty="0"/>
-              <a:t> fie </a:t>
-            </a:r>
-            <a:r>
-              <a:rPr lang="en-US" dirty="0" err="1"/>
-              <a:t>adaptată</a:t>
-            </a:r>
-            <a:r>
-              <a:rPr lang="en-US" dirty="0"/>
-              <a:t> la </a:t>
-            </a:r>
-            <a:r>
-              <a:rPr lang="en-US" dirty="0" err="1"/>
-              <a:t>limba</a:t>
-            </a:r>
-            <a:r>
-              <a:rPr lang="en-US" dirty="0"/>
-              <a:t> </a:t>
-            </a:r>
-            <a:r>
-              <a:rPr lang="en-US" dirty="0" err="1"/>
-              <a:t>regiunii</a:t>
-            </a:r>
-            <a:r>
-              <a:rPr lang="en-US" dirty="0"/>
-              <a:t> respective.</a:t>
-            </a:r>
+              <a:rPr lang="en-US" sz="2000" dirty="0"/>
+              <a:t> parte;</a:t>
+            </a:r>
+            <a:endParaRPr lang="ro-RO" sz="2000" dirty="0"/>
+          </a:p>
+          <a:p>
+            <a:pPr marL="0" indent="0">
+              <a:buNone/>
+            </a:pPr>
+            <a:endParaRPr lang="en-US" sz="2000" dirty="0"/>
           </a:p>
         </p:txBody>
       </p:sp>
@@ -13756,7 +13369,7 @@
           <p:cNvPr id="4" name="Slide Number Placeholder 3">
             <a:extLst>
               <a:ext uri="{FF2B5EF4-FFF2-40B4-BE49-F238E27FC236}">
-                <a16:creationId xmlns:a16="http://schemas.microsoft.com/office/drawing/2014/main" id="{65C6E837-C234-46ED-9EF4-4C14E378F421}"/>
+                <a16:creationId xmlns:a16="http://schemas.microsoft.com/office/drawing/2014/main" id="{77590E5B-5441-4CE2-9E86-9F84D7FC2405}"/>
               </a:ext>
             </a:extLst>
           </p:cNvPr>
@@ -13783,7 +13396,7 @@
     </p:spTree>
     <p:extLst>
       <p:ext uri="{BB962C8B-B14F-4D97-AF65-F5344CB8AC3E}">
-        <p14:creationId xmlns:p14="http://schemas.microsoft.com/office/powerpoint/2010/main" val="3369294763"/>
+        <p14:creationId xmlns:p14="http://schemas.microsoft.com/office/powerpoint/2010/main" val="3867043240"/>
       </p:ext>
     </p:extLst>
   </p:cSld>
@@ -13826,6 +13439,499 @@
           <a:lstStyle/>
           <a:p>
             <a:r>
+              <a:rPr lang="en-US" dirty="0" err="1"/>
+              <a:t>Concluzii</a:t>
+            </a:r>
+            <a:endParaRPr lang="en-US" dirty="0"/>
+          </a:p>
+        </p:txBody>
+      </p:sp>
+      <p:sp>
+        <p:nvSpPr>
+          <p:cNvPr id="3" name="Content Placeholder 2"/>
+          <p:cNvSpPr>
+            <a:spLocks noGrp="1"/>
+          </p:cNvSpPr>
+          <p:nvPr>
+            <p:ph idx="1"/>
+          </p:nvPr>
+        </p:nvSpPr>
+        <p:spPr/>
+        <p:txBody>
+          <a:bodyPr>
+            <a:normAutofit/>
+          </a:bodyPr>
+          <a:lstStyle/>
+          <a:p>
+            <a:r>
+              <a:rPr lang="en-US" dirty="0"/>
+              <a:t>Plan de </a:t>
+            </a:r>
+            <a:r>
+              <a:rPr lang="en-US" dirty="0" err="1"/>
+              <a:t>imbunatatire</a:t>
+            </a:r>
+            <a:endParaRPr lang="en-US" dirty="0"/>
+          </a:p>
+          <a:p>
+            <a:pPr lvl="1"/>
+            <a:r>
+              <a:rPr lang="en-US" dirty="0" err="1"/>
+              <a:t>Pentru</a:t>
+            </a:r>
+            <a:r>
+              <a:rPr lang="en-US" dirty="0"/>
+              <a:t> a </a:t>
+            </a:r>
+            <a:r>
+              <a:rPr lang="en-US" dirty="0" err="1"/>
+              <a:t>optimiza</a:t>
+            </a:r>
+            <a:r>
+              <a:rPr lang="en-US" dirty="0"/>
+              <a:t> </a:t>
+            </a:r>
+            <a:r>
+              <a:rPr lang="en-US" dirty="0" err="1"/>
+              <a:t>aplicația</a:t>
+            </a:r>
+            <a:r>
+              <a:rPr lang="en-US" dirty="0"/>
+              <a:t>, m-am </a:t>
+            </a:r>
+            <a:r>
+              <a:rPr lang="en-US" dirty="0" err="1"/>
+              <a:t>gândit</a:t>
+            </a:r>
+            <a:r>
+              <a:rPr lang="en-US" dirty="0"/>
+              <a:t> la o </a:t>
+            </a:r>
+            <a:r>
+              <a:rPr lang="en-US" dirty="0" err="1"/>
+              <a:t>îmbunătățire</a:t>
+            </a:r>
+            <a:r>
+              <a:rPr lang="en-US" dirty="0"/>
+              <a:t> a </a:t>
+            </a:r>
+            <a:r>
+              <a:rPr lang="en-US" dirty="0" err="1"/>
+              <a:t>algoritmului</a:t>
+            </a:r>
+            <a:r>
+              <a:rPr lang="en-US" dirty="0"/>
+              <a:t> de </a:t>
+            </a:r>
+            <a:r>
+              <a:rPr lang="en-US" dirty="0" err="1"/>
+              <a:t>învățare</a:t>
+            </a:r>
+            <a:r>
+              <a:rPr lang="en-US" dirty="0"/>
+              <a:t> </a:t>
+            </a:r>
+            <a:r>
+              <a:rPr lang="en-US" dirty="0" err="1"/>
+              <a:t>automată</a:t>
+            </a:r>
+            <a:r>
+              <a:rPr lang="en-US" dirty="0"/>
+              <a:t>, </a:t>
+            </a:r>
+            <a:r>
+              <a:rPr lang="en-US" dirty="0" err="1"/>
+              <a:t>prin</a:t>
+            </a:r>
+            <a:r>
+              <a:rPr lang="en-US" dirty="0"/>
+              <a:t> </a:t>
+            </a:r>
+            <a:r>
+              <a:rPr lang="en-US" dirty="0" err="1"/>
+              <a:t>aplicarea</a:t>
+            </a:r>
+            <a:r>
+              <a:rPr lang="en-US" dirty="0"/>
+              <a:t> </a:t>
+            </a:r>
+            <a:r>
+              <a:rPr lang="en-US" dirty="0" err="1"/>
+              <a:t>sa</a:t>
+            </a:r>
+            <a:r>
+              <a:rPr lang="en-US" dirty="0"/>
+              <a:t> la un set de date de </a:t>
+            </a:r>
+            <a:r>
+              <a:rPr lang="en-US" dirty="0" err="1"/>
+              <a:t>antrenament</a:t>
+            </a:r>
+            <a:r>
+              <a:rPr lang="en-US" dirty="0"/>
+              <a:t> </a:t>
+            </a:r>
+            <a:r>
+              <a:rPr lang="en-US" dirty="0" err="1"/>
+              <a:t>mult</a:t>
+            </a:r>
+            <a:r>
+              <a:rPr lang="en-US" dirty="0"/>
+              <a:t> </a:t>
+            </a:r>
+            <a:r>
+              <a:rPr lang="en-US" dirty="0" err="1"/>
+              <a:t>mai</a:t>
+            </a:r>
+            <a:r>
+              <a:rPr lang="en-US" dirty="0"/>
+              <a:t> ample, </a:t>
+            </a:r>
+            <a:r>
+              <a:rPr lang="en-US" dirty="0" err="1"/>
+              <a:t>crescând</a:t>
+            </a:r>
+            <a:r>
+              <a:rPr lang="en-US" dirty="0"/>
+              <a:t> </a:t>
+            </a:r>
+            <a:r>
+              <a:rPr lang="en-US" dirty="0" err="1"/>
+              <a:t>altfel</a:t>
+            </a:r>
+            <a:r>
+              <a:rPr lang="en-US" dirty="0"/>
+              <a:t> </a:t>
+            </a:r>
+            <a:r>
+              <a:rPr lang="en-US" dirty="0" err="1"/>
+              <a:t>probabilitatea</a:t>
+            </a:r>
+            <a:r>
+              <a:rPr lang="en-US" dirty="0"/>
+              <a:t> </a:t>
+            </a:r>
+            <a:r>
+              <a:rPr lang="en-US" dirty="0" err="1"/>
+              <a:t>unei</a:t>
+            </a:r>
+            <a:r>
+              <a:rPr lang="en-US" dirty="0"/>
+              <a:t> </a:t>
+            </a:r>
+            <a:r>
+              <a:rPr lang="en-US" dirty="0" err="1"/>
+              <a:t>clasificări</a:t>
+            </a:r>
+            <a:r>
+              <a:rPr lang="en-US" dirty="0"/>
+              <a:t> </a:t>
+            </a:r>
+            <a:r>
+              <a:rPr lang="en-US" dirty="0" err="1"/>
+              <a:t>cât</a:t>
+            </a:r>
+            <a:r>
+              <a:rPr lang="en-US" dirty="0"/>
+              <a:t> </a:t>
+            </a:r>
+            <a:r>
+              <a:rPr lang="en-US" dirty="0" err="1"/>
+              <a:t>mai</a:t>
+            </a:r>
+            <a:r>
+              <a:rPr lang="en-US" dirty="0"/>
+              <a:t> </a:t>
+            </a:r>
+            <a:r>
+              <a:rPr lang="en-US" dirty="0" err="1"/>
+              <a:t>corecte</a:t>
+            </a:r>
+            <a:r>
+              <a:rPr lang="en-US" dirty="0"/>
+              <a:t>.</a:t>
+            </a:r>
+          </a:p>
+          <a:p>
+            <a:pPr lvl="1"/>
+            <a:r>
+              <a:rPr lang="en-US" dirty="0" err="1"/>
+              <a:t>Pentru</a:t>
+            </a:r>
+            <a:r>
+              <a:rPr lang="en-US" dirty="0"/>
+              <a:t> a-</a:t>
+            </a:r>
+            <a:r>
+              <a:rPr lang="en-US" dirty="0" err="1"/>
+              <a:t>i</a:t>
+            </a:r>
+            <a:r>
+              <a:rPr lang="en-US" dirty="0"/>
+              <a:t> </a:t>
+            </a:r>
+            <a:r>
+              <a:rPr lang="en-US" dirty="0" err="1"/>
+              <a:t>crește</a:t>
+            </a:r>
+            <a:r>
+              <a:rPr lang="en-US" dirty="0"/>
+              <a:t> </a:t>
+            </a:r>
+            <a:r>
+              <a:rPr lang="en-US" dirty="0" err="1"/>
+              <a:t>popularitatea</a:t>
+            </a:r>
+            <a:r>
+              <a:rPr lang="en-US" dirty="0"/>
+              <a:t>, </a:t>
+            </a:r>
+            <a:r>
+              <a:rPr lang="en-US" dirty="0" err="1"/>
+              <a:t>aplicația</a:t>
+            </a:r>
+            <a:r>
+              <a:rPr lang="en-US" dirty="0"/>
+              <a:t> </a:t>
+            </a:r>
+            <a:r>
+              <a:rPr lang="en-US" dirty="0" err="1"/>
+              <a:t>poate</a:t>
+            </a:r>
+            <a:r>
+              <a:rPr lang="en-US" dirty="0"/>
+              <a:t> fi </a:t>
+            </a:r>
+            <a:r>
+              <a:rPr lang="en-US" dirty="0" err="1"/>
+              <a:t>extinsă</a:t>
+            </a:r>
+            <a:r>
+              <a:rPr lang="en-US" dirty="0"/>
+              <a:t> </a:t>
+            </a:r>
+            <a:r>
+              <a:rPr lang="en-US" dirty="0" err="1"/>
+              <a:t>și</a:t>
+            </a:r>
+            <a:r>
+              <a:rPr lang="en-US" dirty="0"/>
+              <a:t> la </a:t>
+            </a:r>
+            <a:r>
+              <a:rPr lang="en-US" dirty="0" err="1"/>
+              <a:t>alte</a:t>
+            </a:r>
+            <a:r>
+              <a:rPr lang="en-US" dirty="0"/>
+              <a:t> </a:t>
+            </a:r>
+            <a:r>
+              <a:rPr lang="en-US" dirty="0" err="1"/>
+              <a:t>culturi</a:t>
+            </a:r>
+            <a:r>
+              <a:rPr lang="en-US" dirty="0"/>
+              <a:t>, </a:t>
+            </a:r>
+            <a:r>
+              <a:rPr lang="en-US" dirty="0" err="1"/>
+              <a:t>să</a:t>
+            </a:r>
+            <a:r>
+              <a:rPr lang="en-US" dirty="0"/>
+              <a:t> </a:t>
+            </a:r>
+            <a:r>
+              <a:rPr lang="en-US" dirty="0" err="1"/>
+              <a:t>conțină</a:t>
+            </a:r>
+            <a:r>
+              <a:rPr lang="en-US" dirty="0"/>
+              <a:t> </a:t>
+            </a:r>
+            <a:r>
+              <a:rPr lang="en-US" dirty="0" err="1"/>
+              <a:t>firme</a:t>
+            </a:r>
+            <a:r>
+              <a:rPr lang="en-US" dirty="0"/>
+              <a:t> din </a:t>
+            </a:r>
+            <a:r>
+              <a:rPr lang="en-US" dirty="0" err="1"/>
+              <a:t>mai</a:t>
+            </a:r>
+            <a:r>
+              <a:rPr lang="en-US" dirty="0"/>
+              <a:t> </a:t>
+            </a:r>
+            <a:r>
+              <a:rPr lang="en-US" dirty="0" err="1"/>
+              <a:t>multe</a:t>
+            </a:r>
+            <a:r>
+              <a:rPr lang="en-US" dirty="0"/>
+              <a:t> </a:t>
+            </a:r>
+            <a:r>
+              <a:rPr lang="en-US" dirty="0" err="1"/>
+              <a:t>țări</a:t>
+            </a:r>
+            <a:r>
+              <a:rPr lang="en-US" dirty="0"/>
+              <a:t>, </a:t>
+            </a:r>
+            <a:r>
+              <a:rPr lang="en-US" dirty="0" err="1"/>
+              <a:t>și</a:t>
+            </a:r>
+            <a:r>
+              <a:rPr lang="en-US" dirty="0"/>
+              <a:t> </a:t>
+            </a:r>
+            <a:r>
+              <a:rPr lang="en-US" dirty="0" err="1"/>
+              <a:t>în</a:t>
+            </a:r>
+            <a:r>
+              <a:rPr lang="en-US" dirty="0"/>
+              <a:t> </a:t>
+            </a:r>
+            <a:r>
+              <a:rPr lang="en-US" dirty="0" err="1"/>
+              <a:t>funcție</a:t>
+            </a:r>
+            <a:r>
+              <a:rPr lang="en-US" dirty="0"/>
+              <a:t> de </a:t>
+            </a:r>
+            <a:r>
+              <a:rPr lang="en-US" dirty="0" err="1"/>
+              <a:t>locație</a:t>
+            </a:r>
+            <a:r>
+              <a:rPr lang="en-US" dirty="0"/>
+              <a:t>, </a:t>
+            </a:r>
+            <a:r>
+              <a:rPr lang="en-US" dirty="0" err="1"/>
+              <a:t>aplicația</a:t>
+            </a:r>
+            <a:r>
+              <a:rPr lang="en-US" dirty="0"/>
+              <a:t> </a:t>
+            </a:r>
+            <a:r>
+              <a:rPr lang="en-US" dirty="0" err="1"/>
+              <a:t>să</a:t>
+            </a:r>
+            <a:r>
+              <a:rPr lang="en-US" dirty="0"/>
+              <a:t> fie </a:t>
+            </a:r>
+            <a:r>
+              <a:rPr lang="en-US" dirty="0" err="1"/>
+              <a:t>adaptată</a:t>
+            </a:r>
+            <a:r>
+              <a:rPr lang="en-US" dirty="0"/>
+              <a:t> la </a:t>
+            </a:r>
+            <a:r>
+              <a:rPr lang="en-US" dirty="0" err="1"/>
+              <a:t>limba</a:t>
+            </a:r>
+            <a:r>
+              <a:rPr lang="en-US" dirty="0"/>
+              <a:t> </a:t>
+            </a:r>
+            <a:r>
+              <a:rPr lang="en-US" dirty="0" err="1"/>
+              <a:t>regiunii</a:t>
+            </a:r>
+            <a:r>
+              <a:rPr lang="en-US" dirty="0"/>
+              <a:t> respective.</a:t>
+            </a:r>
+          </a:p>
+        </p:txBody>
+      </p:sp>
+      <p:sp>
+        <p:nvSpPr>
+          <p:cNvPr id="4" name="Slide Number Placeholder 3">
+            <a:extLst>
+              <a:ext uri="{FF2B5EF4-FFF2-40B4-BE49-F238E27FC236}">
+                <a16:creationId xmlns:a16="http://schemas.microsoft.com/office/drawing/2014/main" id="{65C6E837-C234-46ED-9EF4-4C14E378F421}"/>
+              </a:ext>
+            </a:extLst>
+          </p:cNvPr>
+          <p:cNvSpPr>
+            <a:spLocks noGrp="1"/>
+          </p:cNvSpPr>
+          <p:nvPr>
+            <p:ph type="sldNum" sz="quarter" idx="12"/>
+          </p:nvPr>
+        </p:nvSpPr>
+        <p:spPr/>
+        <p:txBody>
+          <a:bodyPr/>
+          <a:lstStyle/>
+          <a:p>
+            <a:fld id="{6D22F896-40B5-4ADD-8801-0D06FADFA095}" type="slidenum">
+              <a:rPr lang="en-US" smtClean="0"/>
+              <a:t>12</a:t>
+            </a:fld>
+            <a:endParaRPr lang="en-US"/>
+          </a:p>
+        </p:txBody>
+      </p:sp>
+    </p:spTree>
+    <p:extLst>
+      <p:ext uri="{BB962C8B-B14F-4D97-AF65-F5344CB8AC3E}">
+        <p14:creationId xmlns:p14="http://schemas.microsoft.com/office/powerpoint/2010/main" val="3369294763"/>
+      </p:ext>
+    </p:extLst>
+  </p:cSld>
+  <p:clrMapOvr>
+    <a:masterClrMapping/>
+  </p:clrMapOvr>
+</p:sld>
+</file>
+
+<file path=ppt/slides/slide13.xml><?xml version="1.0" encoding="utf-8"?>
+<p:sld xmlns:a="http://schemas.openxmlformats.org/drawingml/2006/main" xmlns:r="http://schemas.openxmlformats.org/officeDocument/2006/relationships" xmlns:p="http://schemas.openxmlformats.org/presentationml/2006/main">
+  <p:cSld>
+    <p:spTree>
+      <p:nvGrpSpPr>
+        <p:cNvPr id="1" name=""/>
+        <p:cNvGrpSpPr/>
+        <p:nvPr/>
+      </p:nvGrpSpPr>
+      <p:grpSpPr>
+        <a:xfrm>
+          <a:off x="0" y="0"/>
+          <a:ext cx="0" cy="0"/>
+          <a:chOff x="0" y="0"/>
+          <a:chExt cx="0" cy="0"/>
+        </a:xfrm>
+      </p:grpSpPr>
+      <p:sp>
+        <p:nvSpPr>
+          <p:cNvPr id="2" name="Title 1"/>
+          <p:cNvSpPr>
+            <a:spLocks noGrp="1"/>
+          </p:cNvSpPr>
+          <p:nvPr>
+            <p:ph type="title"/>
+          </p:nvPr>
+        </p:nvSpPr>
+        <p:spPr/>
+        <p:txBody>
+          <a:bodyPr/>
+          <a:lstStyle/>
+          <a:p>
+            <a:r>
               <a:rPr lang="ro-RO"/>
               <a:t>Intrebari?</a:t>
             </a:r>
@@ -13875,7 +13981,7 @@
           <a:p>
             <a:fld id="{6D22F896-40B5-4ADD-8801-0D06FADFA095}" type="slidenum">
               <a:rPr lang="en-US" smtClean="0"/>
-              <a:t>12</a:t>
+              <a:t>13</a:t>
             </a:fld>
             <a:endParaRPr lang="en-US"/>
           </a:p>
@@ -13951,7 +14057,7 @@
         <p:spPr/>
         <p:txBody>
           <a:bodyPr>
-            <a:normAutofit fontScale="70000" lnSpcReduction="20000"/>
+            <a:noAutofit/>
           </a:bodyPr>
           <a:lstStyle/>
           <a:p>
@@ -13966,17 +14072,17 @@
               <a:buNone/>
             </a:pPr>
             <a:r>
-              <a:rPr lang="en-US" dirty="0"/>
+              <a:rPr lang="en-US" sz="2000" dirty="0"/>
               <a:t>	</a:t>
             </a:r>
             <a:r>
-              <a:rPr lang="ro-RO" dirty="0"/>
+              <a:rPr lang="ro-RO" sz="2000" dirty="0"/>
               <a:t>În ultima perioadă, majoritatea oamenilor achiziționează diverse lucruri de pe internet după un anumit studiu preliminar, iar un rol important în luarea unei astfel de decizii îl au părerile utilizatorilor care au mai cumpărat acel produs și care l-au catalogat la un anumit nivel de calitate. Asemenea site-uri de review-uri sunt răspândite în mediul online, pentru anumite categorii de produse.</a:t>
             </a:r>
           </a:p>
           <a:p>
             <a:r>
-              <a:rPr lang="ro-RO" dirty="0"/>
+              <a:rPr lang="ro-RO" sz="2000" dirty="0"/>
               <a:t>Exemplu</a:t>
             </a:r>
           </a:p>
@@ -13985,23 +14091,8 @@
               <a:buNone/>
             </a:pPr>
             <a:r>
-              <a:rPr lang="ro-RO" dirty="0"/>
+              <a:rPr lang="ro-RO" sz="2000" dirty="0"/>
               <a:t>	TrustPilot, Consumer Reports,  Yelp, Online Review, Go4it, Mobilissimo</a:t>
-            </a:r>
-          </a:p>
-          <a:p>
-            <a:r>
-              <a:rPr lang="ro-RO" dirty="0"/>
-              <a:t>Descriere problemă</a:t>
-            </a:r>
-          </a:p>
-          <a:p>
-            <a:pPr marL="0" indent="0">
-              <a:buNone/>
-            </a:pPr>
-            <a:r>
-              <a:rPr lang="ro-RO" dirty="0"/>
-              <a:t>	Site-urile de review-uri din România au o anumită limitare funcțională, axându-se, în general, pe produse materiale.</a:t>
             </a:r>
           </a:p>
         </p:txBody>
@@ -14067,7 +14158,13 @@
       </p:grpSpPr>
       <p:sp>
         <p:nvSpPr>
-          <p:cNvPr id="2" name="Title 1"/>
+          <p:cNvPr id="2" name="Title 1">
+            <a:extLst>
+              <a:ext uri="{FF2B5EF4-FFF2-40B4-BE49-F238E27FC236}">
+                <a16:creationId xmlns:a16="http://schemas.microsoft.com/office/drawing/2014/main" id="{E073ADB2-4312-4911-AAB3-1E5E23B0EF69}"/>
+              </a:ext>
+            </a:extLst>
+          </p:cNvPr>
           <p:cNvSpPr>
             <a:spLocks noGrp="1"/>
           </p:cNvSpPr>
@@ -14080,17 +14177,19 @@
           <a:bodyPr/>
           <a:lstStyle/>
           <a:p>
-            <a:r>
-              <a:rPr lang="ro-RO"/>
-              <a:t>Problemă	</a:t>
-            </a:r>
             <a:endParaRPr lang="en-US"/>
           </a:p>
         </p:txBody>
       </p:sp>
       <p:sp>
         <p:nvSpPr>
-          <p:cNvPr id="3" name="Content Placeholder 2"/>
+          <p:cNvPr id="3" name="Content Placeholder 2">
+            <a:extLst>
+              <a:ext uri="{FF2B5EF4-FFF2-40B4-BE49-F238E27FC236}">
+                <a16:creationId xmlns:a16="http://schemas.microsoft.com/office/drawing/2014/main" id="{4E31AAE9-E460-45ED-9ABD-397BFC920D8D}"/>
+              </a:ext>
+            </a:extLst>
+          </p:cNvPr>
           <p:cNvSpPr>
             <a:spLocks noGrp="1"/>
           </p:cNvSpPr>
@@ -14100,167 +14199,24 @@
         </p:nvSpPr>
         <p:spPr/>
         <p:txBody>
-          <a:bodyPr>
-            <a:normAutofit/>
-          </a:bodyPr>
+          <a:bodyPr/>
           <a:lstStyle/>
           <a:p>
             <a:r>
-              <a:rPr lang="ro-RO" sz="2000" dirty="0"/>
-              <a:t>Motivați</a:t>
-            </a:r>
-            <a:r>
-              <a:rPr lang="en-US" sz="2000" dirty="0"/>
-              <a:t>e</a:t>
-            </a:r>
-            <a:endParaRPr lang="en-US" sz="1600" dirty="0"/>
-          </a:p>
-          <a:p>
-            <a:pPr lvl="1"/>
-            <a:endParaRPr lang="en-US" sz="1600" dirty="0"/>
-          </a:p>
-          <a:p>
-            <a:pPr lvl="1"/>
-            <a:r>
-              <a:rPr lang="it-IT" sz="1600" dirty="0"/>
-              <a:t>Realizarea unei aplicații pentru crearea unei comunități care să se ajute reciproc pe baza experientelor comune.</a:t>
-            </a:r>
-          </a:p>
-          <a:p>
-            <a:pPr lvl="1"/>
-            <a:r>
-              <a:rPr lang="en-US" sz="1600" dirty="0" err="1"/>
-              <a:t>Lipsa</a:t>
-            </a:r>
-            <a:r>
-              <a:rPr lang="en-US" sz="1600" dirty="0"/>
-              <a:t> </a:t>
-            </a:r>
-            <a:r>
-              <a:rPr lang="en-US" sz="1600" dirty="0" err="1"/>
-              <a:t>unei</a:t>
-            </a:r>
-            <a:r>
-              <a:rPr lang="en-US" sz="1600" dirty="0"/>
-              <a:t> </a:t>
-            </a:r>
-            <a:r>
-              <a:rPr lang="en-US" sz="1600" dirty="0" err="1"/>
-              <a:t>aplicații</a:t>
-            </a:r>
-            <a:r>
-              <a:rPr lang="en-US" sz="1600" dirty="0"/>
-              <a:t> de review-</a:t>
-            </a:r>
-            <a:r>
-              <a:rPr lang="en-US" sz="1600" dirty="0" err="1"/>
-              <a:t>uri</a:t>
-            </a:r>
-            <a:r>
-              <a:rPr lang="en-US" sz="1600" dirty="0"/>
-              <a:t> </a:t>
-            </a:r>
-            <a:r>
-              <a:rPr lang="ro-RO" sz="1600" dirty="0"/>
-              <a:t>in Romania, </a:t>
-            </a:r>
-            <a:r>
-              <a:rPr lang="en-US" sz="1600" dirty="0"/>
-              <a:t>care </a:t>
-            </a:r>
-            <a:r>
-              <a:rPr lang="en-US" sz="1600" dirty="0" err="1"/>
-              <a:t>să</a:t>
-            </a:r>
-            <a:r>
-              <a:rPr lang="en-US" sz="1600" dirty="0"/>
-              <a:t> fie </a:t>
-            </a:r>
-            <a:r>
-              <a:rPr lang="en-US" sz="1600" dirty="0" err="1"/>
-              <a:t>orientată</a:t>
-            </a:r>
-            <a:r>
-              <a:rPr lang="en-US" sz="1600" dirty="0"/>
-              <a:t> </a:t>
-            </a:r>
-            <a:r>
-              <a:rPr lang="en-US" sz="1600" dirty="0" err="1"/>
-              <a:t>către</a:t>
-            </a:r>
-            <a:r>
-              <a:rPr lang="en-US" sz="1600" dirty="0"/>
-              <a:t> </a:t>
-            </a:r>
-            <a:r>
-              <a:rPr lang="en-US" sz="1600" dirty="0" err="1"/>
-              <a:t>domenii</a:t>
-            </a:r>
-            <a:r>
-              <a:rPr lang="en-US" sz="1600" dirty="0"/>
-              <a:t> de </a:t>
-            </a:r>
-            <a:r>
-              <a:rPr lang="en-US" sz="1600" dirty="0" err="1"/>
-              <a:t>activitate</a:t>
-            </a:r>
-            <a:r>
-              <a:rPr lang="en-US" sz="1600" dirty="0"/>
-              <a:t> </a:t>
-            </a:r>
-            <a:r>
-              <a:rPr lang="en-US" sz="1600" dirty="0" err="1"/>
-              <a:t>și</a:t>
-            </a:r>
-            <a:r>
-              <a:rPr lang="en-US" sz="1600" dirty="0"/>
-              <a:t> nu </a:t>
-            </a:r>
-            <a:r>
-              <a:rPr lang="en-US" sz="1600" dirty="0" err="1"/>
-              <a:t>către</a:t>
-            </a:r>
-            <a:r>
-              <a:rPr lang="en-US" sz="1600" dirty="0"/>
-              <a:t> </a:t>
-            </a:r>
-            <a:r>
-              <a:rPr lang="en-US" sz="1600" dirty="0" err="1"/>
-              <a:t>produse</a:t>
-            </a:r>
-            <a:r>
-              <a:rPr lang="en-US" sz="1600" dirty="0"/>
-              <a:t>, </a:t>
-            </a:r>
-            <a:r>
-              <a:rPr lang="en-US" sz="1600" dirty="0" err="1"/>
-              <a:t>obiecte</a:t>
-            </a:r>
-            <a:r>
-              <a:rPr lang="en-US" sz="1600" dirty="0"/>
-              <a:t> </a:t>
-            </a:r>
-            <a:r>
-              <a:rPr lang="en-US" sz="1600" dirty="0" err="1"/>
-              <a:t>materiale</a:t>
-            </a:r>
-            <a:r>
-              <a:rPr lang="en-US" sz="1600" dirty="0"/>
-              <a:t>.</a:t>
-            </a:r>
-            <a:endParaRPr lang="ro-RO" sz="1600" dirty="0"/>
-          </a:p>
-          <a:p>
-            <a:pPr lvl="1"/>
-            <a:r>
-              <a:rPr lang="ro-RO" sz="1600" dirty="0"/>
-              <a:t>Site-urile de acest tip existente la ora actuală forțează utilizatorul la navigarea către o anumită firmă, dintr-o anumită categorie, pentru a adăuga un review.</a:t>
-            </a:r>
-          </a:p>
-          <a:p>
-            <a:pPr marL="457200" lvl="1" indent="0">
+              <a:rPr lang="ro-RO" dirty="0"/>
+              <a:t>Descriere problemă</a:t>
+            </a:r>
+          </a:p>
+          <a:p>
+            <a:pPr marL="0" indent="0">
               <a:buNone/>
             </a:pPr>
+            <a:r>
+              <a:rPr lang="ro-RO" dirty="0"/>
+              <a:t>	Site-urile de review-uri din România au o anumită limitare funcțională, axându-se, în general, pe produse materiale.</a:t>
+            </a:r>
+          </a:p>
+          <a:p>
             <a:endParaRPr lang="en-US" dirty="0"/>
           </a:p>
         </p:txBody>
@@ -14270,7 +14226,7 @@
           <p:cNvPr id="4" name="Slide Number Placeholder 3">
             <a:extLst>
               <a:ext uri="{FF2B5EF4-FFF2-40B4-BE49-F238E27FC236}">
-                <a16:creationId xmlns:a16="http://schemas.microsoft.com/office/drawing/2014/main" id="{0BA68DDB-9111-4FC3-8015-466B099964A2}"/>
+                <a16:creationId xmlns:a16="http://schemas.microsoft.com/office/drawing/2014/main" id="{E3F86C3F-373D-45B9-B186-0490B438AB67}"/>
               </a:ext>
             </a:extLst>
           </p:cNvPr>
@@ -14297,7 +14253,7 @@
     </p:spTree>
     <p:extLst>
       <p:ext uri="{BB962C8B-B14F-4D97-AF65-F5344CB8AC3E}">
-        <p14:creationId xmlns:p14="http://schemas.microsoft.com/office/powerpoint/2010/main" val="1504544289"/>
+        <p14:creationId xmlns:p14="http://schemas.microsoft.com/office/powerpoint/2010/main" val="3353964887"/>
       </p:ext>
     </p:extLst>
   </p:cSld>
@@ -14340,10 +14296,10 @@
           <a:lstStyle/>
           <a:p>
             <a:r>
-              <a:rPr lang="ro-RO" dirty="0"/>
-              <a:t>Soluția propusă</a:t>
-            </a:r>
-            <a:endParaRPr lang="en-US" dirty="0"/>
+              <a:rPr lang="ro-RO"/>
+              <a:t>Problemă	</a:t>
+            </a:r>
+            <a:endParaRPr lang="en-US"/>
           </a:p>
         </p:txBody>
       </p:sp>
@@ -14360,13 +14316,37 @@
         <p:spPr/>
         <p:txBody>
           <a:bodyPr>
-            <a:normAutofit/>
+            <a:normAutofit lnSpcReduction="10000"/>
           </a:bodyPr>
           <a:lstStyle/>
           <a:p>
             <a:r>
+              <a:rPr lang="ro-RO" dirty="0"/>
+              <a:t>Motivați</a:t>
+            </a:r>
+            <a:r>
+              <a:rPr lang="en-US" dirty="0"/>
+              <a:t>e</a:t>
+            </a:r>
+          </a:p>
+          <a:p>
+            <a:pPr lvl="1"/>
+            <a:r>
+              <a:rPr lang="it-IT" dirty="0"/>
+              <a:t>Realizarea unei aplicații pentru crearea unei comunități care să se ajute reciproc pe baza experientelor comune.</a:t>
+            </a:r>
+          </a:p>
+          <a:p>
+            <a:pPr marL="457200" lvl="1" indent="0">
+              <a:buNone/>
+            </a:pPr>
+            <a:endParaRPr lang="it-IT" dirty="0"/>
+          </a:p>
+          <a:p>
+            <a:pPr lvl="1"/>
+            <a:r>
               <a:rPr lang="en-US" dirty="0" err="1"/>
-              <a:t>Spre</a:t>
+              <a:t>Lipsa</a:t>
             </a:r>
             <a:r>
               <a:rPr lang="en-US" dirty="0"/>
@@ -14374,7 +14354,63 @@
             </a:r>
             <a:r>
               <a:rPr lang="en-US" dirty="0" err="1"/>
-              <a:t>deosebire</a:t>
+              <a:t>unei</a:t>
+            </a:r>
+            <a:r>
+              <a:rPr lang="en-US" dirty="0"/>
+              <a:t> </a:t>
+            </a:r>
+            <a:r>
+              <a:rPr lang="en-US" dirty="0" err="1"/>
+              <a:t>aplicații</a:t>
+            </a:r>
+            <a:r>
+              <a:rPr lang="en-US" dirty="0"/>
+              <a:t> de review-</a:t>
+            </a:r>
+            <a:r>
+              <a:rPr lang="en-US" dirty="0" err="1"/>
+              <a:t>uri</a:t>
+            </a:r>
+            <a:r>
+              <a:rPr lang="en-US" dirty="0"/>
+              <a:t> </a:t>
+            </a:r>
+            <a:r>
+              <a:rPr lang="ro-RO" dirty="0"/>
+              <a:t>in Romania, </a:t>
+            </a:r>
+            <a:r>
+              <a:rPr lang="en-US" dirty="0"/>
+              <a:t>care </a:t>
+            </a:r>
+            <a:r>
+              <a:rPr lang="en-US" dirty="0" err="1"/>
+              <a:t>să</a:t>
+            </a:r>
+            <a:r>
+              <a:rPr lang="en-US" dirty="0"/>
+              <a:t> fie </a:t>
+            </a:r>
+            <a:r>
+              <a:rPr lang="en-US" dirty="0" err="1"/>
+              <a:t>orientată</a:t>
+            </a:r>
+            <a:r>
+              <a:rPr lang="en-US" dirty="0"/>
+              <a:t> </a:t>
+            </a:r>
+            <a:r>
+              <a:rPr lang="en-US" dirty="0" err="1"/>
+              <a:t>către</a:t>
+            </a:r>
+            <a:r>
+              <a:rPr lang="en-US" dirty="0"/>
+              <a:t> </a:t>
+            </a:r>
+            <a:r>
+              <a:rPr lang="en-US" dirty="0" err="1"/>
+              <a:t>domenii</a:t>
             </a:r>
             <a:r>
               <a:rPr lang="en-US" dirty="0"/>
@@ -14382,7 +14418,7 @@
             </a:r>
             <a:r>
               <a:rPr lang="en-US" dirty="0" err="1"/>
-              <a:t>restul</a:t>
+              <a:t>activitate</a:t>
             </a:r>
             <a:r>
               <a:rPr lang="en-US" dirty="0"/>
@@ -14390,31 +14426,15 @@
             </a:r>
             <a:r>
               <a:rPr lang="en-US" dirty="0" err="1"/>
-              <a:t>aplicațiilor</a:t>
+              <a:t>și</a:t>
             </a:r>
             <a:r>
               <a:rPr lang="en-US" dirty="0"/>
-              <a:t> de </a:t>
+              <a:t> nu </a:t>
             </a:r>
             <a:r>
               <a:rPr lang="en-US" dirty="0" err="1"/>
-              <a:t>acest</a:t>
-            </a:r>
-            <a:r>
-              <a:rPr lang="en-US" dirty="0"/>
-              <a:t> tip din </a:t>
-            </a:r>
-            <a:r>
-              <a:rPr lang="en-US" dirty="0" err="1"/>
-              <a:t>mediul</a:t>
-            </a:r>
-            <a:r>
-              <a:rPr lang="en-US" dirty="0"/>
-              <a:t> online actual, </a:t>
-            </a:r>
-            <a:r>
-              <a:rPr lang="en-US" dirty="0" err="1"/>
-              <a:t>aplicația</a:t>
+              <a:t>către</a:t>
             </a:r>
             <a:r>
               <a:rPr lang="en-US" dirty="0"/>
@@ -14422,15 +14442,15 @@
             </a:r>
             <a:r>
               <a:rPr lang="en-US" dirty="0" err="1"/>
-              <a:t>propusă</a:t>
+              <a:t>produse</a:t>
             </a:r>
             <a:r>
               <a:rPr lang="en-US" dirty="0"/>
-              <a:t> se </a:t>
+              <a:t>, </a:t>
             </a:r>
             <a:r>
               <a:rPr lang="en-US" dirty="0" err="1"/>
-              <a:t>adresează</a:t>
+              <a:t>obiecte</a:t>
             </a:r>
             <a:r>
               <a:rPr lang="en-US" dirty="0"/>
@@ -14438,79 +14458,7 @@
             </a:r>
             <a:r>
               <a:rPr lang="en-US" dirty="0" err="1"/>
-              <a:t>unor</a:t>
-            </a:r>
-            <a:r>
-              <a:rPr lang="en-US" dirty="0"/>
-              <a:t> </a:t>
-            </a:r>
-            <a:r>
-              <a:rPr lang="en-US" dirty="0" err="1"/>
-              <a:t>domenii</a:t>
-            </a:r>
-            <a:r>
-              <a:rPr lang="en-US" dirty="0"/>
-              <a:t> din </a:t>
-            </a:r>
-            <a:r>
-              <a:rPr lang="en-US" dirty="0" err="1"/>
-              <a:t>anumite</a:t>
-            </a:r>
-            <a:r>
-              <a:rPr lang="en-US" dirty="0"/>
-              <a:t> </a:t>
-            </a:r>
-            <a:r>
-              <a:rPr lang="en-US" dirty="0" err="1"/>
-              <a:t>industrii</a:t>
-            </a:r>
-            <a:r>
-              <a:rPr lang="en-US" dirty="0"/>
-              <a:t>, cum </a:t>
-            </a:r>
-            <a:r>
-              <a:rPr lang="en-US" dirty="0" err="1"/>
-              <a:t>ar</a:t>
-            </a:r>
-            <a:r>
-              <a:rPr lang="en-US" dirty="0"/>
-              <a:t> fi </a:t>
-            </a:r>
-            <a:r>
-              <a:rPr lang="en-US" dirty="0" err="1"/>
-              <a:t>mobilă</a:t>
-            </a:r>
-            <a:r>
-              <a:rPr lang="en-US" dirty="0"/>
-              <a:t>, </a:t>
-            </a:r>
-            <a:r>
-              <a:rPr lang="en-US" dirty="0" err="1"/>
-              <a:t>construcții</a:t>
-            </a:r>
-            <a:r>
-              <a:rPr lang="en-US" dirty="0"/>
-              <a:t> </a:t>
-            </a:r>
-            <a:r>
-              <a:rPr lang="en-US" dirty="0" err="1"/>
-              <a:t>sau</a:t>
-            </a:r>
-            <a:r>
-              <a:rPr lang="en-US" dirty="0"/>
-              <a:t> </a:t>
-            </a:r>
-            <a:r>
-              <a:rPr lang="en-US" dirty="0" err="1"/>
-              <a:t>foraje</a:t>
-            </a:r>
-            <a:r>
-              <a:rPr lang="en-US" dirty="0"/>
-              <a:t> </a:t>
-            </a:r>
-            <a:r>
-              <a:rPr lang="en-US" dirty="0" err="1"/>
-              <a:t>fântâni</a:t>
+              <a:t>materiale</a:t>
             </a:r>
             <a:r>
               <a:rPr lang="en-US" dirty="0"/>
@@ -14518,192 +14466,22 @@
             </a:r>
           </a:p>
           <a:p>
-            <a:r>
-              <a:rPr lang="en-US" dirty="0" err="1"/>
-              <a:t>Oferă</a:t>
-            </a:r>
-            <a:r>
-              <a:rPr lang="en-US" dirty="0"/>
-              <a:t> o </a:t>
-            </a:r>
-            <a:r>
-              <a:rPr lang="en-US" dirty="0" err="1"/>
-              <a:t>locație</a:t>
-            </a:r>
-            <a:r>
-              <a:rPr lang="en-US" dirty="0"/>
-              <a:t> </a:t>
-            </a:r>
-            <a:r>
-              <a:rPr lang="en-US" dirty="0" err="1"/>
-              <a:t>virtuală</a:t>
-            </a:r>
-            <a:r>
-              <a:rPr lang="en-US" dirty="0"/>
-              <a:t> </a:t>
-            </a:r>
-            <a:r>
-              <a:rPr lang="en-US" dirty="0" err="1"/>
-              <a:t>în</a:t>
-            </a:r>
-            <a:r>
-              <a:rPr lang="en-US" dirty="0"/>
-              <a:t> care </a:t>
-            </a:r>
-            <a:r>
-              <a:rPr lang="en-US" dirty="0" err="1"/>
-              <a:t>utilizatorii</a:t>
-            </a:r>
-            <a:r>
-              <a:rPr lang="en-US" dirty="0"/>
-              <a:t> </a:t>
-            </a:r>
-            <a:r>
-              <a:rPr lang="en-US" dirty="0" err="1"/>
-              <a:t>să</a:t>
-            </a:r>
-            <a:r>
-              <a:rPr lang="en-US" dirty="0"/>
-              <a:t> </a:t>
-            </a:r>
-            <a:r>
-              <a:rPr lang="en-US" dirty="0" err="1"/>
-              <a:t>găsească</a:t>
-            </a:r>
-            <a:r>
-              <a:rPr lang="en-US" dirty="0"/>
-              <a:t> </a:t>
-            </a:r>
-            <a:r>
-              <a:rPr lang="en-US" dirty="0" err="1"/>
-              <a:t>mai</a:t>
-            </a:r>
-            <a:r>
-              <a:rPr lang="en-US" dirty="0"/>
-              <a:t> </a:t>
-            </a:r>
-            <a:r>
-              <a:rPr lang="en-US" dirty="0" err="1"/>
-              <a:t>ușor</a:t>
-            </a:r>
-            <a:r>
-              <a:rPr lang="en-US" dirty="0"/>
-              <a:t> </a:t>
-            </a:r>
-            <a:r>
-              <a:rPr lang="en-US" dirty="0" err="1"/>
-              <a:t>toate</a:t>
-            </a:r>
-            <a:r>
-              <a:rPr lang="en-US" dirty="0"/>
-              <a:t> </a:t>
-            </a:r>
-            <a:r>
-              <a:rPr lang="en-US" dirty="0" err="1"/>
-              <a:t>firmele</a:t>
-            </a:r>
-            <a:r>
-              <a:rPr lang="en-US" dirty="0"/>
-              <a:t> </a:t>
-            </a:r>
-            <a:r>
-              <a:rPr lang="en-US" dirty="0" err="1"/>
-              <a:t>dintr</a:t>
-            </a:r>
-            <a:r>
-              <a:rPr lang="en-US" dirty="0"/>
-              <a:t>-un </a:t>
-            </a:r>
-            <a:r>
-              <a:rPr lang="en-US" dirty="0" err="1"/>
-              <a:t>anumit</a:t>
-            </a:r>
-            <a:r>
-              <a:rPr lang="en-US" dirty="0"/>
-              <a:t> </a:t>
-            </a:r>
-            <a:r>
-              <a:rPr lang="en-US" dirty="0" err="1"/>
-              <a:t>domeniu</a:t>
-            </a:r>
-            <a:r>
-              <a:rPr lang="en-US" dirty="0"/>
-              <a:t> </a:t>
-            </a:r>
-            <a:r>
-              <a:rPr lang="en-US" dirty="0" err="1"/>
-              <a:t>și</a:t>
-            </a:r>
-            <a:r>
-              <a:rPr lang="en-US" dirty="0"/>
-              <a:t> </a:t>
-            </a:r>
-            <a:r>
-              <a:rPr lang="en-US" dirty="0" err="1"/>
-              <a:t>să</a:t>
-            </a:r>
-            <a:r>
-              <a:rPr lang="en-US" dirty="0"/>
-              <a:t> </a:t>
-            </a:r>
-            <a:r>
-              <a:rPr lang="en-US" dirty="0" err="1"/>
-              <a:t>vizualizeze</a:t>
-            </a:r>
-            <a:r>
-              <a:rPr lang="en-US" dirty="0"/>
-              <a:t>/</a:t>
-            </a:r>
-            <a:r>
-              <a:rPr lang="en-US" dirty="0" err="1"/>
-              <a:t>ofere</a:t>
-            </a:r>
-            <a:r>
-              <a:rPr lang="en-US" dirty="0"/>
-              <a:t> o </a:t>
-            </a:r>
-            <a:r>
-              <a:rPr lang="en-US" dirty="0" err="1"/>
-              <a:t>recenzie</a:t>
-            </a:r>
-            <a:r>
-              <a:rPr lang="en-US" dirty="0"/>
-              <a:t>, </a:t>
-            </a:r>
-            <a:r>
-              <a:rPr lang="en-US" dirty="0" err="1"/>
-              <a:t>fără</a:t>
-            </a:r>
-            <a:r>
-              <a:rPr lang="en-US" dirty="0"/>
-              <a:t> a </a:t>
-            </a:r>
-            <a:r>
-              <a:rPr lang="en-US" dirty="0" err="1"/>
-              <a:t>naviga</a:t>
-            </a:r>
-            <a:r>
-              <a:rPr lang="en-US" dirty="0"/>
-              <a:t> la site-ul </a:t>
-            </a:r>
-            <a:r>
-              <a:rPr lang="en-US" dirty="0" err="1"/>
-              <a:t>fiecărei</a:t>
-            </a:r>
-            <a:r>
-              <a:rPr lang="en-US" dirty="0"/>
-              <a:t> </a:t>
-            </a:r>
-            <a:r>
-              <a:rPr lang="en-US" dirty="0" err="1"/>
-              <a:t>firme</a:t>
-            </a:r>
+            <a:pPr marL="457200" lvl="1" indent="0">
+              <a:buNone/>
+            </a:pPr>
+            <a:endParaRPr lang="ro-RO" dirty="0"/>
+          </a:p>
+          <a:p>
+            <a:pPr lvl="1"/>
             <a:r>
               <a:rPr lang="ro-RO" dirty="0"/>
-              <a:t>.</a:t>
-            </a:r>
-          </a:p>
-          <a:p>
+              <a:t>Site-urile de acest tip existente la ora actuală forțează utilizatorul la navigarea către o anumită firmă, dintr-o anumită categorie, pentru a adăuga un review.</a:t>
+            </a:r>
+          </a:p>
+          <a:p>
+            <a:pPr marL="457200" lvl="1" indent="0">
+              <a:buNone/>
+            </a:pPr>
             <a:endParaRPr lang="en-US" dirty="0"/>
           </a:p>
         </p:txBody>
@@ -14713,7 +14491,7 @@
           <p:cNvPr id="4" name="Slide Number Placeholder 3">
             <a:extLst>
               <a:ext uri="{FF2B5EF4-FFF2-40B4-BE49-F238E27FC236}">
-                <a16:creationId xmlns:a16="http://schemas.microsoft.com/office/drawing/2014/main" id="{924393E8-C020-41A8-B6F4-271065C7B788}"/>
+                <a16:creationId xmlns:a16="http://schemas.microsoft.com/office/drawing/2014/main" id="{0BA68DDB-9111-4FC3-8015-466B099964A2}"/>
               </a:ext>
             </a:extLst>
           </p:cNvPr>
@@ -14740,7 +14518,7 @@
     </p:spTree>
     <p:extLst>
       <p:ext uri="{BB962C8B-B14F-4D97-AF65-F5344CB8AC3E}">
-        <p14:creationId xmlns:p14="http://schemas.microsoft.com/office/powerpoint/2010/main" val="1305747311"/>
+        <p14:creationId xmlns:p14="http://schemas.microsoft.com/office/powerpoint/2010/main" val="1504544289"/>
       </p:ext>
     </p:extLst>
   </p:cSld>
@@ -14784,7 +14562,7 @@
           <a:p>
             <a:r>
               <a:rPr lang="ro-RO" dirty="0"/>
-              <a:t>Arhitectură</a:t>
+              <a:t>Soluția propusă</a:t>
             </a:r>
             <a:endParaRPr lang="en-US" dirty="0"/>
           </a:p>
@@ -14803,136 +14581,582 @@
         <p:spPr/>
         <p:txBody>
           <a:bodyPr>
-            <a:normAutofit fontScale="92500"/>
+            <a:normAutofit/>
           </a:bodyPr>
           <a:lstStyle/>
           <a:p>
             <a:r>
-              <a:rPr lang="en-US" dirty="0" err="1"/>
+              <a:rPr lang="en-US" sz="2000" dirty="0" err="1"/>
               <a:t>Spre</a:t>
             </a:r>
             <a:r>
-              <a:rPr lang="en-US" dirty="0"/>
+              <a:rPr lang="en-US" sz="2000" dirty="0"/>
               <a:t> </a:t>
             </a:r>
             <a:r>
-              <a:rPr lang="en-US" dirty="0" err="1"/>
+              <a:rPr lang="en-US" sz="2000" dirty="0" err="1"/>
               <a:t>deosebire</a:t>
             </a:r>
             <a:r>
-              <a:rPr lang="en-US" dirty="0"/>
+              <a:rPr lang="en-US" sz="2000" dirty="0"/>
               <a:t> de </a:t>
             </a:r>
             <a:r>
-              <a:rPr lang="en-US" dirty="0" err="1"/>
+              <a:rPr lang="en-US" sz="2000" dirty="0" err="1"/>
+              <a:t>restul</a:t>
+            </a:r>
+            <a:r>
+              <a:rPr lang="en-US" sz="2000" dirty="0"/>
+              <a:t> </a:t>
+            </a:r>
+            <a:r>
+              <a:rPr lang="en-US" sz="2000" dirty="0" err="1"/>
+              <a:t>aplicațiilor</a:t>
+            </a:r>
+            <a:r>
+              <a:rPr lang="en-US" sz="2000" dirty="0"/>
+              <a:t> de </a:t>
+            </a:r>
+            <a:r>
+              <a:rPr lang="en-US" sz="2000" dirty="0" err="1"/>
+              <a:t>acest</a:t>
+            </a:r>
+            <a:r>
+              <a:rPr lang="en-US" sz="2000" dirty="0"/>
+              <a:t> tip din </a:t>
+            </a:r>
+            <a:r>
+              <a:rPr lang="en-US" sz="2000" dirty="0" err="1"/>
+              <a:t>mediul</a:t>
+            </a:r>
+            <a:r>
+              <a:rPr lang="en-US" sz="2000" dirty="0"/>
+              <a:t> online actual, </a:t>
+            </a:r>
+            <a:r>
+              <a:rPr lang="en-US" sz="2000" dirty="0" err="1"/>
+              <a:t>aplicația</a:t>
+            </a:r>
+            <a:r>
+              <a:rPr lang="en-US" sz="2000" dirty="0"/>
+              <a:t> </a:t>
+            </a:r>
+            <a:r>
+              <a:rPr lang="en-US" sz="2000" dirty="0" err="1"/>
+              <a:t>propusă</a:t>
+            </a:r>
+            <a:r>
+              <a:rPr lang="en-US" sz="2000" dirty="0"/>
+              <a:t> se </a:t>
+            </a:r>
+            <a:r>
+              <a:rPr lang="en-US" sz="2000" dirty="0" err="1"/>
+              <a:t>adresează</a:t>
+            </a:r>
+            <a:r>
+              <a:rPr lang="en-US" sz="2000" dirty="0"/>
+              <a:t> </a:t>
+            </a:r>
+            <a:r>
+              <a:rPr lang="en-US" sz="2000" dirty="0" err="1"/>
+              <a:t>unor</a:t>
+            </a:r>
+            <a:r>
+              <a:rPr lang="en-US" sz="2000" dirty="0"/>
+              <a:t> </a:t>
+            </a:r>
+            <a:r>
+              <a:rPr lang="en-US" sz="2000" dirty="0" err="1"/>
+              <a:t>domenii</a:t>
+            </a:r>
+            <a:r>
+              <a:rPr lang="en-US" sz="2000" dirty="0"/>
+              <a:t> din </a:t>
+            </a:r>
+            <a:r>
+              <a:rPr lang="en-US" sz="2000" dirty="0" err="1"/>
+              <a:t>anumite</a:t>
+            </a:r>
+            <a:r>
+              <a:rPr lang="en-US" sz="2000" dirty="0"/>
+              <a:t> </a:t>
+            </a:r>
+            <a:r>
+              <a:rPr lang="en-US" sz="2000" dirty="0" err="1"/>
+              <a:t>industrii</a:t>
+            </a:r>
+            <a:r>
+              <a:rPr lang="en-US" sz="2000" dirty="0"/>
+              <a:t>, cum </a:t>
+            </a:r>
+            <a:r>
+              <a:rPr lang="en-US" sz="2000" dirty="0" err="1"/>
+              <a:t>ar</a:t>
+            </a:r>
+            <a:r>
+              <a:rPr lang="en-US" sz="2000" dirty="0"/>
+              <a:t> fi </a:t>
+            </a:r>
+            <a:r>
+              <a:rPr lang="en-US" sz="2000" dirty="0" err="1"/>
+              <a:t>mobilă</a:t>
+            </a:r>
+            <a:r>
+              <a:rPr lang="en-US" sz="2000" dirty="0"/>
+              <a:t>, </a:t>
+            </a:r>
+            <a:r>
+              <a:rPr lang="en-US" sz="2000" dirty="0" err="1"/>
+              <a:t>construcții</a:t>
+            </a:r>
+            <a:r>
+              <a:rPr lang="en-US" sz="2000" dirty="0"/>
+              <a:t> </a:t>
+            </a:r>
+            <a:r>
+              <a:rPr lang="en-US" sz="2000" dirty="0" err="1"/>
+              <a:t>sau</a:t>
+            </a:r>
+            <a:r>
+              <a:rPr lang="en-US" sz="2000" dirty="0"/>
+              <a:t> </a:t>
+            </a:r>
+            <a:r>
+              <a:rPr lang="en-US" sz="2000" dirty="0" err="1"/>
+              <a:t>foraje</a:t>
+            </a:r>
+            <a:r>
+              <a:rPr lang="en-US" sz="2000" dirty="0"/>
+              <a:t> </a:t>
+            </a:r>
+            <a:r>
+              <a:rPr lang="en-US" sz="2000" dirty="0" err="1"/>
+              <a:t>fântâni</a:t>
+            </a:r>
+            <a:r>
+              <a:rPr lang="en-US" sz="2000" dirty="0"/>
+              <a:t>.</a:t>
+            </a:r>
+          </a:p>
+          <a:p>
+            <a:endParaRPr lang="en-US" sz="2000" dirty="0"/>
+          </a:p>
+          <a:p>
+            <a:r>
+              <a:rPr lang="en-US" sz="2000" dirty="0" err="1"/>
+              <a:t>Oferă</a:t>
+            </a:r>
+            <a:r>
+              <a:rPr lang="en-US" sz="2000" dirty="0"/>
+              <a:t> o </a:t>
+            </a:r>
+            <a:r>
+              <a:rPr lang="en-US" sz="2000" dirty="0" err="1"/>
+              <a:t>locație</a:t>
+            </a:r>
+            <a:r>
+              <a:rPr lang="en-US" sz="2000" dirty="0"/>
+              <a:t> </a:t>
+            </a:r>
+            <a:r>
+              <a:rPr lang="en-US" sz="2000" dirty="0" err="1"/>
+              <a:t>virtuală</a:t>
+            </a:r>
+            <a:r>
+              <a:rPr lang="en-US" sz="2000" dirty="0"/>
+              <a:t> </a:t>
+            </a:r>
+            <a:r>
+              <a:rPr lang="en-US" sz="2000" dirty="0" err="1"/>
+              <a:t>în</a:t>
+            </a:r>
+            <a:r>
+              <a:rPr lang="en-US" sz="2000" dirty="0"/>
+              <a:t> care </a:t>
+            </a:r>
+            <a:r>
+              <a:rPr lang="en-US" sz="2000" dirty="0" err="1"/>
+              <a:t>utilizatorii</a:t>
+            </a:r>
+            <a:r>
+              <a:rPr lang="en-US" sz="2000" dirty="0"/>
+              <a:t> </a:t>
+            </a:r>
+            <a:r>
+              <a:rPr lang="en-US" sz="2000" dirty="0" err="1"/>
+              <a:t>să</a:t>
+            </a:r>
+            <a:r>
+              <a:rPr lang="en-US" sz="2000" dirty="0"/>
+              <a:t> </a:t>
+            </a:r>
+            <a:r>
+              <a:rPr lang="en-US" sz="2000" dirty="0" err="1"/>
+              <a:t>găsească</a:t>
+            </a:r>
+            <a:r>
+              <a:rPr lang="en-US" sz="2000" dirty="0"/>
+              <a:t> </a:t>
+            </a:r>
+            <a:r>
+              <a:rPr lang="en-US" sz="2000" dirty="0" err="1"/>
+              <a:t>mai</a:t>
+            </a:r>
+            <a:r>
+              <a:rPr lang="en-US" sz="2000" dirty="0"/>
+              <a:t> </a:t>
+            </a:r>
+            <a:r>
+              <a:rPr lang="en-US" sz="2000" dirty="0" err="1"/>
+              <a:t>ușor</a:t>
+            </a:r>
+            <a:r>
+              <a:rPr lang="en-US" sz="2000" dirty="0"/>
+              <a:t> </a:t>
+            </a:r>
+            <a:r>
+              <a:rPr lang="en-US" sz="2000" dirty="0" err="1"/>
+              <a:t>toate</a:t>
+            </a:r>
+            <a:r>
+              <a:rPr lang="en-US" sz="2000" dirty="0"/>
+              <a:t> </a:t>
+            </a:r>
+            <a:r>
+              <a:rPr lang="en-US" sz="2000" dirty="0" err="1"/>
+              <a:t>firmele</a:t>
+            </a:r>
+            <a:r>
+              <a:rPr lang="en-US" sz="2000" dirty="0"/>
+              <a:t> </a:t>
+            </a:r>
+            <a:r>
+              <a:rPr lang="en-US" sz="2000" dirty="0" err="1"/>
+              <a:t>dintr</a:t>
+            </a:r>
+            <a:r>
+              <a:rPr lang="en-US" sz="2000" dirty="0"/>
+              <a:t>-un </a:t>
+            </a:r>
+            <a:r>
+              <a:rPr lang="en-US" sz="2000" dirty="0" err="1"/>
+              <a:t>anumit</a:t>
+            </a:r>
+            <a:r>
+              <a:rPr lang="en-US" sz="2000" dirty="0"/>
+              <a:t> </a:t>
+            </a:r>
+            <a:r>
+              <a:rPr lang="en-US" sz="2000" dirty="0" err="1"/>
+              <a:t>domeniu</a:t>
+            </a:r>
+            <a:r>
+              <a:rPr lang="en-US" sz="2000" dirty="0"/>
+              <a:t> </a:t>
+            </a:r>
+            <a:r>
+              <a:rPr lang="en-US" sz="2000" dirty="0" err="1"/>
+              <a:t>și</a:t>
+            </a:r>
+            <a:r>
+              <a:rPr lang="en-US" sz="2000" dirty="0"/>
+              <a:t> </a:t>
+            </a:r>
+            <a:r>
+              <a:rPr lang="en-US" sz="2000" dirty="0" err="1"/>
+              <a:t>să</a:t>
+            </a:r>
+            <a:r>
+              <a:rPr lang="en-US" sz="2000" dirty="0"/>
+              <a:t> </a:t>
+            </a:r>
+            <a:r>
+              <a:rPr lang="en-US" sz="2000" dirty="0" err="1"/>
+              <a:t>vizualizeze</a:t>
+            </a:r>
+            <a:r>
+              <a:rPr lang="en-US" sz="2000" dirty="0"/>
+              <a:t>/</a:t>
+            </a:r>
+            <a:r>
+              <a:rPr lang="en-US" sz="2000" dirty="0" err="1"/>
+              <a:t>ofere</a:t>
+            </a:r>
+            <a:r>
+              <a:rPr lang="en-US" sz="2000" dirty="0"/>
+              <a:t> o </a:t>
+            </a:r>
+            <a:r>
+              <a:rPr lang="en-US" sz="2000" dirty="0" err="1"/>
+              <a:t>recenzie</a:t>
+            </a:r>
+            <a:r>
+              <a:rPr lang="en-US" sz="2000" dirty="0"/>
+              <a:t>, </a:t>
+            </a:r>
+            <a:r>
+              <a:rPr lang="en-US" sz="2000" dirty="0" err="1"/>
+              <a:t>fără</a:t>
+            </a:r>
+            <a:r>
+              <a:rPr lang="en-US" sz="2000" dirty="0"/>
+              <a:t> a </a:t>
+            </a:r>
+            <a:r>
+              <a:rPr lang="en-US" sz="2000" dirty="0" err="1"/>
+              <a:t>naviga</a:t>
+            </a:r>
+            <a:r>
+              <a:rPr lang="en-US" sz="2000" dirty="0"/>
+              <a:t> la site-ul </a:t>
+            </a:r>
+            <a:r>
+              <a:rPr lang="en-US" sz="2000" dirty="0" err="1"/>
+              <a:t>fiecărei</a:t>
+            </a:r>
+            <a:r>
+              <a:rPr lang="en-US" sz="2000" dirty="0"/>
+              <a:t> </a:t>
+            </a:r>
+            <a:r>
+              <a:rPr lang="en-US" sz="2000" dirty="0" err="1"/>
+              <a:t>firme</a:t>
+            </a:r>
+            <a:r>
+              <a:rPr lang="ro-RO" sz="2000" dirty="0"/>
+              <a:t>.</a:t>
+            </a:r>
+          </a:p>
+          <a:p>
+            <a:endParaRPr lang="en-US" sz="2000" dirty="0"/>
+          </a:p>
+        </p:txBody>
+      </p:sp>
+      <p:sp>
+        <p:nvSpPr>
+          <p:cNvPr id="4" name="Slide Number Placeholder 3">
+            <a:extLst>
+              <a:ext uri="{FF2B5EF4-FFF2-40B4-BE49-F238E27FC236}">
+                <a16:creationId xmlns:a16="http://schemas.microsoft.com/office/drawing/2014/main" id="{924393E8-C020-41A8-B6F4-271065C7B788}"/>
+              </a:ext>
+            </a:extLst>
+          </p:cNvPr>
+          <p:cNvSpPr>
+            <a:spLocks noGrp="1"/>
+          </p:cNvSpPr>
+          <p:nvPr>
+            <p:ph type="sldNum" sz="quarter" idx="12"/>
+          </p:nvPr>
+        </p:nvSpPr>
+        <p:spPr/>
+        <p:txBody>
+          <a:bodyPr/>
+          <a:lstStyle/>
+          <a:p>
+            <a:fld id="{6D22F896-40B5-4ADD-8801-0D06FADFA095}" type="slidenum">
+              <a:rPr lang="en-US" smtClean="0"/>
+              <a:t>5</a:t>
+            </a:fld>
+            <a:endParaRPr lang="en-US"/>
+          </a:p>
+        </p:txBody>
+      </p:sp>
+    </p:spTree>
+    <p:extLst>
+      <p:ext uri="{BB962C8B-B14F-4D97-AF65-F5344CB8AC3E}">
+        <p14:creationId xmlns:p14="http://schemas.microsoft.com/office/powerpoint/2010/main" val="1305747311"/>
+      </p:ext>
+    </p:extLst>
+  </p:cSld>
+  <p:clrMapOvr>
+    <a:masterClrMapping/>
+  </p:clrMapOvr>
+</p:sld>
+</file>
+
+<file path=ppt/slides/slide6.xml><?xml version="1.0" encoding="utf-8"?>
+<p:sld xmlns:a="http://schemas.openxmlformats.org/drawingml/2006/main" xmlns:r="http://schemas.openxmlformats.org/officeDocument/2006/relationships" xmlns:p="http://schemas.openxmlformats.org/presentationml/2006/main">
+  <p:cSld>
+    <p:spTree>
+      <p:nvGrpSpPr>
+        <p:cNvPr id="1" name=""/>
+        <p:cNvGrpSpPr/>
+        <p:nvPr/>
+      </p:nvGrpSpPr>
+      <p:grpSpPr>
+        <a:xfrm>
+          <a:off x="0" y="0"/>
+          <a:ext cx="0" cy="0"/>
+          <a:chOff x="0" y="0"/>
+          <a:chExt cx="0" cy="0"/>
+        </a:xfrm>
+      </p:grpSpPr>
+      <p:sp>
+        <p:nvSpPr>
+          <p:cNvPr id="2" name="Title 1"/>
+          <p:cNvSpPr>
+            <a:spLocks noGrp="1"/>
+          </p:cNvSpPr>
+          <p:nvPr>
+            <p:ph type="title"/>
+          </p:nvPr>
+        </p:nvSpPr>
+        <p:spPr/>
+        <p:txBody>
+          <a:bodyPr/>
+          <a:lstStyle/>
+          <a:p>
+            <a:r>
+              <a:rPr lang="ro-RO" dirty="0"/>
+              <a:t>Arhitectură</a:t>
+            </a:r>
+            <a:endParaRPr lang="en-US" dirty="0"/>
+          </a:p>
+        </p:txBody>
+      </p:sp>
+      <p:sp>
+        <p:nvSpPr>
+          <p:cNvPr id="3" name="Content Placeholder 2"/>
+          <p:cNvSpPr>
+            <a:spLocks noGrp="1"/>
+          </p:cNvSpPr>
+          <p:nvPr>
+            <p:ph idx="1"/>
+          </p:nvPr>
+        </p:nvSpPr>
+        <p:spPr/>
+        <p:txBody>
+          <a:bodyPr>
+            <a:normAutofit/>
+          </a:bodyPr>
+          <a:lstStyle/>
+          <a:p>
+            <a:r>
+              <a:rPr lang="en-US" sz="2000" dirty="0" err="1"/>
+              <a:t>Spre</a:t>
+            </a:r>
+            <a:r>
+              <a:rPr lang="en-US" sz="2000" dirty="0"/>
+              <a:t> </a:t>
+            </a:r>
+            <a:r>
+              <a:rPr lang="en-US" sz="2000" dirty="0" err="1"/>
+              <a:t>deosebire</a:t>
+            </a:r>
+            <a:r>
+              <a:rPr lang="en-US" sz="2000" dirty="0"/>
+              <a:t> de </a:t>
+            </a:r>
+            <a:r>
+              <a:rPr lang="en-US" sz="2000" dirty="0" err="1"/>
               <a:t>alte</a:t>
             </a:r>
             <a:r>
-              <a:rPr lang="en-US" dirty="0"/>
+              <a:rPr lang="en-US" sz="2000" dirty="0"/>
               <a:t> </a:t>
             </a:r>
             <a:r>
-              <a:rPr lang="en-US" dirty="0" err="1"/>
+              <a:rPr lang="en-US" sz="2000" dirty="0" err="1"/>
               <a:t>aplicații</a:t>
             </a:r>
             <a:r>
-              <a:rPr lang="en-US" dirty="0"/>
+              <a:rPr lang="en-US" sz="2000" dirty="0"/>
               <a:t>, am </a:t>
             </a:r>
             <a:r>
-              <a:rPr lang="en-US" dirty="0" err="1"/>
+              <a:rPr lang="en-US" sz="2000" dirty="0" err="1"/>
               <a:t>optat</a:t>
             </a:r>
             <a:r>
-              <a:rPr lang="en-US" dirty="0"/>
+              <a:rPr lang="en-US" sz="2000" dirty="0"/>
               <a:t> </a:t>
             </a:r>
             <a:r>
-              <a:rPr lang="en-US" dirty="0" err="1"/>
+              <a:rPr lang="en-US" sz="2000" dirty="0" err="1"/>
               <a:t>pentru</a:t>
             </a:r>
             <a:r>
-              <a:rPr lang="en-US" dirty="0"/>
+              <a:rPr lang="en-US" sz="2000" dirty="0"/>
               <a:t> </a:t>
             </a:r>
             <a:r>
-              <a:rPr lang="en-US" dirty="0" err="1"/>
+              <a:rPr lang="en-US" sz="2000" dirty="0" err="1"/>
               <a:t>implementarea</a:t>
             </a:r>
             <a:r>
-              <a:rPr lang="en-US" dirty="0"/>
+              <a:rPr lang="en-US" sz="2000" dirty="0"/>
               <a:t> </a:t>
             </a:r>
             <a:r>
-              <a:rPr lang="en-US" dirty="0" err="1"/>
+              <a:rPr lang="en-US" sz="2000" dirty="0" err="1"/>
               <a:t>unui</a:t>
             </a:r>
             <a:r>
-              <a:rPr lang="en-US" dirty="0"/>
+              <a:rPr lang="en-US" sz="2000" dirty="0"/>
               <a:t> </a:t>
             </a:r>
             <a:r>
-              <a:rPr lang="en-US" dirty="0" err="1"/>
+              <a:rPr lang="en-US" sz="2000" dirty="0" err="1"/>
               <a:t>clasificator</a:t>
             </a:r>
             <a:r>
-              <a:rPr lang="en-US" dirty="0"/>
+              <a:rPr lang="en-US" sz="2000" dirty="0"/>
               <a:t> Bayes </a:t>
             </a:r>
             <a:r>
-              <a:rPr lang="en-US" dirty="0" err="1"/>
+              <a:rPr lang="en-US" sz="2000" dirty="0" err="1"/>
               <a:t>Naiv</a:t>
             </a:r>
             <a:r>
-              <a:rPr lang="en-US" dirty="0"/>
+              <a:rPr lang="en-US" sz="2000" dirty="0"/>
               <a:t>, care </a:t>
             </a:r>
             <a:r>
-              <a:rPr lang="en-US" dirty="0" err="1"/>
+              <a:rPr lang="en-US" sz="2000" dirty="0" err="1"/>
               <a:t>să</a:t>
             </a:r>
             <a:r>
-              <a:rPr lang="en-US" dirty="0"/>
+              <a:rPr lang="en-US" sz="2000" dirty="0"/>
               <a:t> </a:t>
             </a:r>
             <a:r>
-              <a:rPr lang="en-US" dirty="0" err="1"/>
+              <a:rPr lang="en-US" sz="2000" dirty="0" err="1"/>
               <a:t>clasifice</a:t>
             </a:r>
             <a:r>
-              <a:rPr lang="en-US" dirty="0"/>
+              <a:rPr lang="en-US" sz="2000" dirty="0"/>
               <a:t> automat review-ul pe </a:t>
             </a:r>
             <a:r>
-              <a:rPr lang="en-US" dirty="0" err="1"/>
+              <a:rPr lang="en-US" sz="2000" dirty="0" err="1"/>
               <a:t>baza</a:t>
             </a:r>
             <a:r>
-              <a:rPr lang="en-US" dirty="0"/>
+              <a:rPr lang="en-US" sz="2000" dirty="0"/>
               <a:t> </a:t>
             </a:r>
             <a:r>
-              <a:rPr lang="en-US" dirty="0" err="1"/>
+              <a:rPr lang="en-US" sz="2000" dirty="0" err="1"/>
               <a:t>unor</a:t>
             </a:r>
             <a:r>
-              <a:rPr lang="en-US" dirty="0"/>
+              <a:rPr lang="en-US" sz="2000" dirty="0"/>
               <a:t> </a:t>
             </a:r>
             <a:r>
-              <a:rPr lang="en-US" dirty="0" err="1"/>
+              <a:rPr lang="en-US" sz="2000" dirty="0" err="1"/>
               <a:t>cuvinte</a:t>
             </a:r>
             <a:r>
-              <a:rPr lang="en-US" dirty="0"/>
+              <a:rPr lang="en-US" sz="2000" dirty="0"/>
               <a:t> </a:t>
             </a:r>
             <a:r>
-              <a:rPr lang="en-US" dirty="0" err="1"/>
+              <a:rPr lang="en-US" sz="2000" dirty="0" err="1"/>
               <a:t>cheie</a:t>
             </a:r>
             <a:r>
-              <a:rPr lang="en-US" dirty="0"/>
+              <a:rPr lang="en-US" sz="2000" dirty="0"/>
               <a:t>.</a:t>
             </a:r>
           </a:p>
@@ -14940,87 +15164,87 @@
             <a:pPr marL="0" indent="0">
               <a:buNone/>
             </a:pPr>
-            <a:endParaRPr lang="en-US" dirty="0"/>
-          </a:p>
-          <a:p>
-            <a:r>
-              <a:rPr lang="en-US" dirty="0" err="1"/>
+            <a:endParaRPr lang="en-US" sz="2000" dirty="0"/>
+          </a:p>
+          <a:p>
+            <a:r>
+              <a:rPr lang="en-US" sz="2000" dirty="0" err="1"/>
               <a:t>Utilizatorii</a:t>
             </a:r>
             <a:r>
-              <a:rPr lang="en-US" dirty="0"/>
+              <a:rPr lang="en-US" sz="2000" dirty="0"/>
               <a:t> au </a:t>
             </a:r>
             <a:r>
-              <a:rPr lang="en-US" dirty="0" err="1"/>
+              <a:rPr lang="en-US" sz="2000" dirty="0" err="1"/>
               <a:t>posibilitatea</a:t>
             </a:r>
             <a:r>
-              <a:rPr lang="en-US" dirty="0"/>
+              <a:rPr lang="en-US" sz="2000" dirty="0"/>
               <a:t> de a introduce direct review-ul pe </a:t>
             </a:r>
             <a:r>
-              <a:rPr lang="en-US" dirty="0" err="1"/>
+              <a:rPr lang="en-US" sz="2000" dirty="0" err="1"/>
               <a:t>pagina</a:t>
             </a:r>
             <a:r>
-              <a:rPr lang="en-US" dirty="0"/>
+              <a:rPr lang="en-US" sz="2000" dirty="0"/>
               <a:t> </a:t>
             </a:r>
             <a:r>
-              <a:rPr lang="en-US" dirty="0" err="1"/>
+              <a:rPr lang="en-US" sz="2000" dirty="0" err="1"/>
               <a:t>principală</a:t>
             </a:r>
             <a:r>
-              <a:rPr lang="en-US" dirty="0"/>
+              <a:rPr lang="en-US" sz="2000" dirty="0"/>
               <a:t>, </a:t>
             </a:r>
             <a:r>
-              <a:rPr lang="en-US" dirty="0" err="1"/>
+              <a:rPr lang="en-US" sz="2000" dirty="0" err="1"/>
               <a:t>fără</a:t>
             </a:r>
             <a:r>
-              <a:rPr lang="en-US" dirty="0"/>
+              <a:rPr lang="en-US" sz="2000" dirty="0"/>
               <a:t> a </a:t>
             </a:r>
             <a:r>
-              <a:rPr lang="en-US" dirty="0" err="1"/>
+              <a:rPr lang="en-US" sz="2000" dirty="0" err="1"/>
               <a:t>naviga</a:t>
             </a:r>
             <a:r>
-              <a:rPr lang="en-US" dirty="0"/>
+              <a:rPr lang="en-US" sz="2000" dirty="0"/>
               <a:t> la o </a:t>
             </a:r>
             <a:r>
-              <a:rPr lang="en-US" dirty="0" err="1"/>
+              <a:rPr lang="en-US" sz="2000" dirty="0" err="1"/>
               <a:t>anumită</a:t>
             </a:r>
             <a:r>
-              <a:rPr lang="en-US" dirty="0"/>
+              <a:rPr lang="en-US" sz="2000" dirty="0"/>
               <a:t> </a:t>
             </a:r>
             <a:r>
-              <a:rPr lang="en-US" dirty="0" err="1"/>
+              <a:rPr lang="en-US" sz="2000" dirty="0" err="1"/>
               <a:t>firmă</a:t>
             </a:r>
             <a:r>
-              <a:rPr lang="en-US" dirty="0"/>
+              <a:rPr lang="en-US" sz="2000" dirty="0"/>
               <a:t> </a:t>
             </a:r>
             <a:r>
-              <a:rPr lang="en-US" dirty="0" err="1"/>
+              <a:rPr lang="en-US" sz="2000" dirty="0" err="1"/>
               <a:t>dintr</a:t>
             </a:r>
             <a:r>
-              <a:rPr lang="en-US" dirty="0"/>
+              <a:rPr lang="en-US" sz="2000" dirty="0"/>
               <a:t>-o </a:t>
             </a:r>
             <a:r>
-              <a:rPr lang="en-US" dirty="0" err="1"/>
+              <a:rPr lang="en-US" sz="2000" dirty="0" err="1"/>
               <a:t>categorie</a:t>
             </a:r>
             <a:r>
-              <a:rPr lang="en-US" dirty="0"/>
+              <a:rPr lang="en-US" sz="2000" dirty="0"/>
               <a:t>.</a:t>
             </a:r>
           </a:p>
@@ -15028,47 +15252,47 @@
             <a:pPr marL="0" indent="0">
               <a:buNone/>
             </a:pPr>
-            <a:endParaRPr lang="en-US" dirty="0"/>
-          </a:p>
-          <a:p>
-            <a:r>
-              <a:rPr lang="en-US" dirty="0" err="1"/>
+            <a:endParaRPr lang="en-US" sz="2000" dirty="0"/>
+          </a:p>
+          <a:p>
+            <a:r>
+              <a:rPr lang="en-US" sz="2000" dirty="0" err="1"/>
               <a:t>Arhitectura</a:t>
             </a:r>
             <a:r>
-              <a:rPr lang="en-US" dirty="0"/>
+              <a:rPr lang="en-US" sz="2000" dirty="0"/>
               <a:t> </a:t>
             </a:r>
             <a:r>
-              <a:rPr lang="en-US" dirty="0" err="1"/>
+              <a:rPr lang="en-US" sz="2000" dirty="0" err="1"/>
               <a:t>aplica</a:t>
             </a:r>
             <a:r>
-              <a:rPr lang="ro-RO" dirty="0"/>
+              <a:rPr lang="ro-RO" sz="2000" dirty="0"/>
               <a:t>ț</a:t>
             </a:r>
             <a:r>
-              <a:rPr lang="en-US" dirty="0" err="1"/>
+              <a:rPr lang="en-US" sz="2000" dirty="0" err="1"/>
               <a:t>iei</a:t>
             </a:r>
             <a:r>
-              <a:rPr lang="en-US" dirty="0"/>
+              <a:rPr lang="en-US" sz="2000" dirty="0"/>
               <a:t> respect</a:t>
             </a:r>
             <a:r>
-              <a:rPr lang="ro-RO" dirty="0"/>
+              <a:rPr lang="ro-RO" sz="2000" dirty="0"/>
               <a:t>ă</a:t>
             </a:r>
             <a:r>
-              <a:rPr lang="en-US" dirty="0"/>
+              <a:rPr lang="en-US" sz="2000" dirty="0"/>
               <a:t> </a:t>
             </a:r>
             <a:r>
-              <a:rPr lang="en-US" dirty="0" err="1"/>
+              <a:rPr lang="en-US" sz="2000" dirty="0" err="1"/>
               <a:t>modelul</a:t>
             </a:r>
             <a:r>
-              <a:rPr lang="en-US" dirty="0"/>
+              <a:rPr lang="en-US" sz="2000" dirty="0"/>
               <a:t> client-server:</a:t>
             </a:r>
           </a:p>
@@ -15097,7 +15321,7 @@
           <a:p>
             <a:fld id="{6D22F896-40B5-4ADD-8801-0D06FADFA095}" type="slidenum">
               <a:rPr lang="en-US" smtClean="0"/>
-              <a:t>5</a:t>
+              <a:t>6</a:t>
             </a:fld>
             <a:endParaRPr lang="en-US"/>
           </a:p>
@@ -15116,7 +15340,7 @@
 </p:sld>
 </file>
 
-<file path=ppt/slides/slide6.xml><?xml version="1.0" encoding="utf-8"?>
+<file path=ppt/slides/slide7.xml><?xml version="1.0" encoding="utf-8"?>
 <p:sld xmlns:a="http://schemas.openxmlformats.org/drawingml/2006/main" xmlns:r="http://schemas.openxmlformats.org/officeDocument/2006/relationships" xmlns:p="http://schemas.openxmlformats.org/presentationml/2006/main">
   <p:cSld>
     <p:spTree>
@@ -15212,7 +15436,7 @@
           <a:p>
             <a:fld id="{6D22F896-40B5-4ADD-8801-0D06FADFA095}" type="slidenum">
               <a:rPr lang="en-US" smtClean="0"/>
-              <a:t>6</a:t>
+              <a:t>7</a:t>
             </a:fld>
             <a:endParaRPr lang="en-US"/>
           </a:p>
@@ -15231,7 +15455,7 @@
 </p:sld>
 </file>
 
-<file path=ppt/slides/slide7.xml><?xml version="1.0" encoding="utf-8"?>
+<file path=ppt/slides/slide8.xml><?xml version="1.0" encoding="utf-8"?>
 <p:sld xmlns:a="http://schemas.openxmlformats.org/drawingml/2006/main" xmlns:r="http://schemas.openxmlformats.org/officeDocument/2006/relationships" xmlns:p="http://schemas.openxmlformats.org/presentationml/2006/main">
   <p:cSld>
     <p:spTree>
@@ -15281,10 +15505,15 @@
             <p:ph idx="1"/>
           </p:nvPr>
         </p:nvSpPr>
-        <p:spPr/>
+        <p:spPr>
+          <a:xfrm>
+            <a:off x="1141413" y="2097088"/>
+            <a:ext cx="9905999" cy="3541714"/>
+          </a:xfrm>
+        </p:spPr>
         <p:txBody>
           <a:bodyPr>
-            <a:normAutofit fontScale="92500" lnSpcReduction="20000"/>
+            <a:noAutofit/>
           </a:bodyPr>
           <a:lstStyle/>
           <a:p>
@@ -15808,7 +16037,7 @@
           <a:p>
             <a:fld id="{6D22F896-40B5-4ADD-8801-0D06FADFA095}" type="slidenum">
               <a:rPr lang="en-US" smtClean="0"/>
-              <a:t>7</a:t>
+              <a:t>8</a:t>
             </a:fld>
             <a:endParaRPr lang="en-US"/>
           </a:p>
@@ -15827,7 +16056,7 @@
 </p:sld>
 </file>
 
-<file path=ppt/slides/slide8.xml><?xml version="1.0" encoding="utf-8"?>
+<file path=ppt/slides/slide9.xml><?xml version="1.0" encoding="utf-8"?>
 <p:sld xmlns:a="http://schemas.openxmlformats.org/drawingml/2006/main" xmlns:r="http://schemas.openxmlformats.org/officeDocument/2006/relationships" xmlns:p="http://schemas.openxmlformats.org/presentationml/2006/main">
   <p:cSld>
     <p:spTree>
@@ -17041,7 +17270,7 @@
           <a:p>
             <a:fld id="{6D22F896-40B5-4ADD-8801-0D06FADFA095}" type="slidenum">
               <a:rPr lang="en-US" smtClean="0"/>
-              <a:t>8</a:t>
+              <a:t>9</a:t>
             </a:fld>
             <a:endParaRPr lang="en-US"/>
           </a:p>
@@ -17051,107 +17280,6 @@
     <p:extLst>
       <p:ext uri="{BB962C8B-B14F-4D97-AF65-F5344CB8AC3E}">
         <p14:creationId xmlns:p14="http://schemas.microsoft.com/office/powerpoint/2010/main" val="3644675346"/>
-      </p:ext>
-    </p:extLst>
-  </p:cSld>
-  <p:clrMapOvr>
-    <a:masterClrMapping/>
-  </p:clrMapOvr>
-</p:sld>
-</file>
-
-<file path=ppt/slides/slide9.xml><?xml version="1.0" encoding="utf-8"?>
-<p:sld xmlns:a="http://schemas.openxmlformats.org/drawingml/2006/main" xmlns:r="http://schemas.openxmlformats.org/officeDocument/2006/relationships" xmlns:p="http://schemas.openxmlformats.org/presentationml/2006/main">
-  <p:cSld>
-    <p:spTree>
-      <p:nvGrpSpPr>
-        <p:cNvPr id="1" name=""/>
-        <p:cNvGrpSpPr/>
-        <p:nvPr/>
-      </p:nvGrpSpPr>
-      <p:grpSpPr>
-        <a:xfrm>
-          <a:off x="0" y="0"/>
-          <a:ext cx="0" cy="0"/>
-          <a:chOff x="0" y="0"/>
-          <a:chExt cx="0" cy="0"/>
-        </a:xfrm>
-      </p:grpSpPr>
-      <p:sp>
-        <p:nvSpPr>
-          <p:cNvPr id="2" name="Title 1"/>
-          <p:cNvSpPr>
-            <a:spLocks noGrp="1"/>
-          </p:cNvSpPr>
-          <p:nvPr>
-            <p:ph type="title"/>
-          </p:nvPr>
-        </p:nvSpPr>
-        <p:spPr/>
-        <p:txBody>
-          <a:bodyPr/>
-          <a:lstStyle/>
-          <a:p>
-            <a:r>
-              <a:rPr lang="ro-RO"/>
-              <a:t>DEmo</a:t>
-            </a:r>
-            <a:endParaRPr lang="en-US"/>
-          </a:p>
-        </p:txBody>
-      </p:sp>
-      <p:sp>
-        <p:nvSpPr>
-          <p:cNvPr id="3" name="Content Placeholder 2"/>
-          <p:cNvSpPr>
-            <a:spLocks noGrp="1"/>
-          </p:cNvSpPr>
-          <p:nvPr>
-            <p:ph idx="1"/>
-          </p:nvPr>
-        </p:nvSpPr>
-        <p:spPr/>
-        <p:txBody>
-          <a:bodyPr/>
-          <a:lstStyle/>
-          <a:p>
-            <a:endParaRPr lang="en-US"/>
-          </a:p>
-        </p:txBody>
-      </p:sp>
-      <p:sp>
-        <p:nvSpPr>
-          <p:cNvPr id="4" name="Slide Number Placeholder 3">
-            <a:extLst>
-              <a:ext uri="{FF2B5EF4-FFF2-40B4-BE49-F238E27FC236}">
-                <a16:creationId xmlns:a16="http://schemas.microsoft.com/office/drawing/2014/main" id="{D6E04812-7890-41C0-B4D9-A5E2F5ACD91F}"/>
-              </a:ext>
-            </a:extLst>
-          </p:cNvPr>
-          <p:cNvSpPr>
-            <a:spLocks noGrp="1"/>
-          </p:cNvSpPr>
-          <p:nvPr>
-            <p:ph type="sldNum" sz="quarter" idx="12"/>
-          </p:nvPr>
-        </p:nvSpPr>
-        <p:spPr/>
-        <p:txBody>
-          <a:bodyPr/>
-          <a:lstStyle/>
-          <a:p>
-            <a:fld id="{6D22F896-40B5-4ADD-8801-0D06FADFA095}" type="slidenum">
-              <a:rPr lang="en-US" smtClean="0"/>
-              <a:t>9</a:t>
-            </a:fld>
-            <a:endParaRPr lang="en-US"/>
-          </a:p>
-        </p:txBody>
-      </p:sp>
-    </p:spTree>
-    <p:extLst>
-      <p:ext uri="{BB962C8B-B14F-4D97-AF65-F5344CB8AC3E}">
-        <p14:creationId xmlns:p14="http://schemas.microsoft.com/office/powerpoint/2010/main" val="4180818445"/>
       </p:ext>
     </p:extLst>
   </p:cSld>

</xml_diff>